<commit_message>
added greedy algs to presentation
</commit_message>
<xml_diff>
--- a/presentations/lukas_chapters.pptx
+++ b/presentations/lukas_chapters.pptx
@@ -12,6 +12,13 @@
     <p:sldId id="260" r:id="rId6"/>
     <p:sldId id="261" r:id="rId7"/>
     <p:sldId id="263" r:id="rId8"/>
+    <p:sldId id="264" r:id="rId9"/>
+    <p:sldId id="265" r:id="rId10"/>
+    <p:sldId id="267" r:id="rId11"/>
+    <p:sldId id="266" r:id="rId12"/>
+    <p:sldId id="268" r:id="rId13"/>
+    <p:sldId id="269" r:id="rId14"/>
+    <p:sldId id="270" r:id="rId15"/>
   </p:sldIdLst>
   <p:sldSz cx="12192000" cy="6858000"/>
   <p:notesSz cx="6858000" cy="9144000"/>
@@ -249,7 +256,7 @@
           <a:p>
             <a:fld id="{4ABDDB1E-4DC6-400E-93E9-01B8D6702F69}" type="datetimeFigureOut">
               <a:rPr lang="en-GB" smtClean="0"/>
-              <a:t>22/07/2022</a:t>
+              <a:t>26/07/2022</a:t>
             </a:fld>
             <a:endParaRPr lang="en-GB"/>
           </a:p>
@@ -419,7 +426,7 @@
           <a:p>
             <a:fld id="{4ABDDB1E-4DC6-400E-93E9-01B8D6702F69}" type="datetimeFigureOut">
               <a:rPr lang="en-GB" smtClean="0"/>
-              <a:t>22/07/2022</a:t>
+              <a:t>26/07/2022</a:t>
             </a:fld>
             <a:endParaRPr lang="en-GB"/>
           </a:p>
@@ -599,7 +606,7 @@
           <a:p>
             <a:fld id="{4ABDDB1E-4DC6-400E-93E9-01B8D6702F69}" type="datetimeFigureOut">
               <a:rPr lang="en-GB" smtClean="0"/>
-              <a:t>22/07/2022</a:t>
+              <a:t>26/07/2022</a:t>
             </a:fld>
             <a:endParaRPr lang="en-GB"/>
           </a:p>
@@ -769,7 +776,7 @@
           <a:p>
             <a:fld id="{4ABDDB1E-4DC6-400E-93E9-01B8D6702F69}" type="datetimeFigureOut">
               <a:rPr lang="en-GB" smtClean="0"/>
-              <a:t>22/07/2022</a:t>
+              <a:t>26/07/2022</a:t>
             </a:fld>
             <a:endParaRPr lang="en-GB"/>
           </a:p>
@@ -1015,7 +1022,7 @@
           <a:p>
             <a:fld id="{4ABDDB1E-4DC6-400E-93E9-01B8D6702F69}" type="datetimeFigureOut">
               <a:rPr lang="en-GB" smtClean="0"/>
-              <a:t>22/07/2022</a:t>
+              <a:t>26/07/2022</a:t>
             </a:fld>
             <a:endParaRPr lang="en-GB"/>
           </a:p>
@@ -1247,7 +1254,7 @@
           <a:p>
             <a:fld id="{4ABDDB1E-4DC6-400E-93E9-01B8D6702F69}" type="datetimeFigureOut">
               <a:rPr lang="en-GB" smtClean="0"/>
-              <a:t>22/07/2022</a:t>
+              <a:t>26/07/2022</a:t>
             </a:fld>
             <a:endParaRPr lang="en-GB"/>
           </a:p>
@@ -1614,7 +1621,7 @@
           <a:p>
             <a:fld id="{4ABDDB1E-4DC6-400E-93E9-01B8D6702F69}" type="datetimeFigureOut">
               <a:rPr lang="en-GB" smtClean="0"/>
-              <a:t>22/07/2022</a:t>
+              <a:t>26/07/2022</a:t>
             </a:fld>
             <a:endParaRPr lang="en-GB"/>
           </a:p>
@@ -1732,7 +1739,7 @@
           <a:p>
             <a:fld id="{4ABDDB1E-4DC6-400E-93E9-01B8D6702F69}" type="datetimeFigureOut">
               <a:rPr lang="en-GB" smtClean="0"/>
-              <a:t>22/07/2022</a:t>
+              <a:t>26/07/2022</a:t>
             </a:fld>
             <a:endParaRPr lang="en-GB"/>
           </a:p>
@@ -1827,7 +1834,7 @@
           <a:p>
             <a:fld id="{4ABDDB1E-4DC6-400E-93E9-01B8D6702F69}" type="datetimeFigureOut">
               <a:rPr lang="en-GB" smtClean="0"/>
-              <a:t>22/07/2022</a:t>
+              <a:t>26/07/2022</a:t>
             </a:fld>
             <a:endParaRPr lang="en-GB"/>
           </a:p>
@@ -2104,7 +2111,7 @@
           <a:p>
             <a:fld id="{4ABDDB1E-4DC6-400E-93E9-01B8D6702F69}" type="datetimeFigureOut">
               <a:rPr lang="en-GB" smtClean="0"/>
-              <a:t>22/07/2022</a:t>
+              <a:t>26/07/2022</a:t>
             </a:fld>
             <a:endParaRPr lang="en-GB"/>
           </a:p>
@@ -2357,7 +2364,7 @@
           <a:p>
             <a:fld id="{4ABDDB1E-4DC6-400E-93E9-01B8D6702F69}" type="datetimeFigureOut">
               <a:rPr lang="en-GB" smtClean="0"/>
-              <a:t>22/07/2022</a:t>
+              <a:t>26/07/2022</a:t>
             </a:fld>
             <a:endParaRPr lang="en-GB"/>
           </a:p>
@@ -2570,7 +2577,7 @@
           <a:p>
             <a:fld id="{4ABDDB1E-4DC6-400E-93E9-01B8D6702F69}" type="datetimeFigureOut">
               <a:rPr lang="en-GB" smtClean="0"/>
-              <a:t>22/07/2022</a:t>
+              <a:t>26/07/2022</a:t>
             </a:fld>
             <a:endParaRPr lang="en-GB"/>
           </a:p>
@@ -3061,6 +3068,1851 @@
     <p:tnLst>
       <p:par>
         <p:cTn id="1" dur="indefinite" restart="never" nodeType="tmRoot"/>
+      </p:par>
+    </p:tnLst>
+  </p:timing>
+</p:sld>
+</file>
+
+<file path=ppt/slides/slide10.xml><?xml version="1.0" encoding="utf-8"?>
+<p:sld xmlns:a="http://schemas.openxmlformats.org/drawingml/2006/main" xmlns:r="http://schemas.openxmlformats.org/officeDocument/2006/relationships" xmlns:p="http://schemas.openxmlformats.org/presentationml/2006/main">
+  <p:cSld>
+    <p:spTree>
+      <p:nvGrpSpPr>
+        <p:cNvPr id="1" name=""/>
+        <p:cNvGrpSpPr/>
+        <p:nvPr/>
+      </p:nvGrpSpPr>
+      <p:grpSpPr>
+        <a:xfrm>
+          <a:off x="0" y="0"/>
+          <a:ext cx="0" cy="0"/>
+          <a:chOff x="0" y="0"/>
+          <a:chExt cx="0" cy="0"/>
+        </a:xfrm>
+      </p:grpSpPr>
+      <p:pic>
+        <p:nvPicPr>
+          <p:cNvPr id="5" name="Picture 4"/>
+          <p:cNvPicPr>
+            <a:picLocks noChangeAspect="1"/>
+          </p:cNvPicPr>
+          <p:nvPr/>
+        </p:nvPicPr>
+        <p:blipFill>
+          <a:blip r:embed="rId2"/>
+          <a:stretch>
+            <a:fillRect/>
+          </a:stretch>
+        </p:blipFill>
+        <p:spPr>
+          <a:xfrm>
+            <a:off x="1" y="0"/>
+            <a:ext cx="2497014" cy="340863"/>
+          </a:xfrm>
+          <a:prstGeom prst="rect">
+            <a:avLst/>
+          </a:prstGeom>
+        </p:spPr>
+      </p:pic>
+      <p:pic>
+        <p:nvPicPr>
+          <p:cNvPr id="2" name="Picture 1"/>
+          <p:cNvPicPr>
+            <a:picLocks noChangeAspect="1"/>
+          </p:cNvPicPr>
+          <p:nvPr/>
+        </p:nvPicPr>
+        <p:blipFill>
+          <a:blip r:embed="rId3"/>
+          <a:stretch>
+            <a:fillRect/>
+          </a:stretch>
+        </p:blipFill>
+        <p:spPr>
+          <a:xfrm>
+            <a:off x="1153257" y="990600"/>
+            <a:ext cx="1704975" cy="295275"/>
+          </a:xfrm>
+          <a:prstGeom prst="rect">
+            <a:avLst/>
+          </a:prstGeom>
+        </p:spPr>
+      </p:pic>
+      <p:pic>
+        <p:nvPicPr>
+          <p:cNvPr id="16" name="Picture 15"/>
+          <p:cNvPicPr>
+            <a:picLocks noChangeAspect="1"/>
+          </p:cNvPicPr>
+          <p:nvPr/>
+        </p:nvPicPr>
+        <p:blipFill>
+          <a:blip r:embed="rId4"/>
+          <a:stretch>
+            <a:fillRect/>
+          </a:stretch>
+        </p:blipFill>
+        <p:spPr>
+          <a:xfrm>
+            <a:off x="4253281" y="1285875"/>
+            <a:ext cx="3028950" cy="1095375"/>
+          </a:xfrm>
+          <a:prstGeom prst="rect">
+            <a:avLst/>
+          </a:prstGeom>
+        </p:spPr>
+      </p:pic>
+      <p:pic>
+        <p:nvPicPr>
+          <p:cNvPr id="8" name="Picture 7"/>
+          <p:cNvPicPr>
+            <a:picLocks noChangeAspect="1"/>
+          </p:cNvPicPr>
+          <p:nvPr/>
+        </p:nvPicPr>
+        <p:blipFill>
+          <a:blip r:embed="rId5"/>
+          <a:stretch>
+            <a:fillRect/>
+          </a:stretch>
+        </p:blipFill>
+        <p:spPr>
+          <a:xfrm>
+            <a:off x="943343" y="2635860"/>
+            <a:ext cx="6619875" cy="1000125"/>
+          </a:xfrm>
+          <a:prstGeom prst="rect">
+            <a:avLst/>
+          </a:prstGeom>
+        </p:spPr>
+      </p:pic>
+      <p:pic>
+        <p:nvPicPr>
+          <p:cNvPr id="9" name="Picture 8"/>
+          <p:cNvPicPr>
+            <a:picLocks noChangeAspect="1"/>
+          </p:cNvPicPr>
+          <p:nvPr/>
+        </p:nvPicPr>
+        <p:blipFill>
+          <a:blip r:embed="rId6"/>
+          <a:stretch>
+            <a:fillRect/>
+          </a:stretch>
+        </p:blipFill>
+        <p:spPr>
+          <a:xfrm>
+            <a:off x="955065" y="3890595"/>
+            <a:ext cx="3209925" cy="1219200"/>
+          </a:xfrm>
+          <a:prstGeom prst="rect">
+            <a:avLst/>
+          </a:prstGeom>
+        </p:spPr>
+      </p:pic>
+      <p:pic>
+        <p:nvPicPr>
+          <p:cNvPr id="10" name="Picture 9"/>
+          <p:cNvPicPr>
+            <a:picLocks noChangeAspect="1"/>
+          </p:cNvPicPr>
+          <p:nvPr/>
+        </p:nvPicPr>
+        <p:blipFill>
+          <a:blip r:embed="rId7"/>
+          <a:stretch>
+            <a:fillRect/>
+          </a:stretch>
+        </p:blipFill>
+        <p:spPr>
+          <a:xfrm>
+            <a:off x="7282231" y="5488069"/>
+            <a:ext cx="2705100" cy="885825"/>
+          </a:xfrm>
+          <a:prstGeom prst="rect">
+            <a:avLst/>
+          </a:prstGeom>
+        </p:spPr>
+      </p:pic>
+    </p:spTree>
+    <p:extLst>
+      <p:ext uri="{BB962C8B-B14F-4D97-AF65-F5344CB8AC3E}">
+        <p14:creationId xmlns:p14="http://schemas.microsoft.com/office/powerpoint/2010/main" val="2489491418"/>
+      </p:ext>
+    </p:extLst>
+  </p:cSld>
+  <p:clrMapOvr>
+    <a:masterClrMapping/>
+  </p:clrMapOvr>
+  <p:timing>
+    <p:tnLst>
+      <p:par>
+        <p:cTn id="1" dur="indefinite" restart="never" nodeType="tmRoot">
+          <p:childTnLst>
+            <p:seq concurrent="1" nextAc="seek">
+              <p:cTn id="2" dur="indefinite" nodeType="mainSeq">
+                <p:childTnLst>
+                  <p:par>
+                    <p:cTn id="3" fill="hold">
+                      <p:stCondLst>
+                        <p:cond delay="indefinite"/>
+                      </p:stCondLst>
+                      <p:childTnLst>
+                        <p:par>
+                          <p:cTn id="4" fill="hold">
+                            <p:stCondLst>
+                              <p:cond delay="0"/>
+                            </p:stCondLst>
+                            <p:childTnLst>
+                              <p:par>
+                                <p:cTn id="5" presetID="1" presetClass="entr" presetSubtype="0" fill="hold" nodeType="clickEffect">
+                                  <p:stCondLst>
+                                    <p:cond delay="0"/>
+                                  </p:stCondLst>
+                                  <p:childTnLst>
+                                    <p:set>
+                                      <p:cBhvr>
+                                        <p:cTn id="6" dur="1" fill="hold">
+                                          <p:stCondLst>
+                                            <p:cond delay="0"/>
+                                          </p:stCondLst>
+                                        </p:cTn>
+                                        <p:tgtEl>
+                                          <p:spTgt spid="8"/>
+                                        </p:tgtEl>
+                                        <p:attrNameLst>
+                                          <p:attrName>style.visibility</p:attrName>
+                                        </p:attrNameLst>
+                                      </p:cBhvr>
+                                      <p:to>
+                                        <p:strVal val="visible"/>
+                                      </p:to>
+                                    </p:set>
+                                  </p:childTnLst>
+                                </p:cTn>
+                              </p:par>
+                            </p:childTnLst>
+                          </p:cTn>
+                        </p:par>
+                      </p:childTnLst>
+                    </p:cTn>
+                  </p:par>
+                  <p:par>
+                    <p:cTn id="7" fill="hold">
+                      <p:stCondLst>
+                        <p:cond delay="indefinite"/>
+                      </p:stCondLst>
+                      <p:childTnLst>
+                        <p:par>
+                          <p:cTn id="8" fill="hold">
+                            <p:stCondLst>
+                              <p:cond delay="0"/>
+                            </p:stCondLst>
+                            <p:childTnLst>
+                              <p:par>
+                                <p:cTn id="9" presetID="1" presetClass="entr" presetSubtype="0" fill="hold" nodeType="clickEffect">
+                                  <p:stCondLst>
+                                    <p:cond delay="0"/>
+                                  </p:stCondLst>
+                                  <p:childTnLst>
+                                    <p:set>
+                                      <p:cBhvr>
+                                        <p:cTn id="10" dur="1" fill="hold">
+                                          <p:stCondLst>
+                                            <p:cond delay="0"/>
+                                          </p:stCondLst>
+                                        </p:cTn>
+                                        <p:tgtEl>
+                                          <p:spTgt spid="9"/>
+                                        </p:tgtEl>
+                                        <p:attrNameLst>
+                                          <p:attrName>style.visibility</p:attrName>
+                                        </p:attrNameLst>
+                                      </p:cBhvr>
+                                      <p:to>
+                                        <p:strVal val="visible"/>
+                                      </p:to>
+                                    </p:set>
+                                  </p:childTnLst>
+                                </p:cTn>
+                              </p:par>
+                            </p:childTnLst>
+                          </p:cTn>
+                        </p:par>
+                      </p:childTnLst>
+                    </p:cTn>
+                  </p:par>
+                  <p:par>
+                    <p:cTn id="11" fill="hold">
+                      <p:stCondLst>
+                        <p:cond delay="indefinite"/>
+                      </p:stCondLst>
+                      <p:childTnLst>
+                        <p:par>
+                          <p:cTn id="12" fill="hold">
+                            <p:stCondLst>
+                              <p:cond delay="0"/>
+                            </p:stCondLst>
+                            <p:childTnLst>
+                              <p:par>
+                                <p:cTn id="13" presetID="1" presetClass="entr" presetSubtype="0" fill="hold" nodeType="clickEffect">
+                                  <p:stCondLst>
+                                    <p:cond delay="0"/>
+                                  </p:stCondLst>
+                                  <p:childTnLst>
+                                    <p:set>
+                                      <p:cBhvr>
+                                        <p:cTn id="14" dur="1" fill="hold">
+                                          <p:stCondLst>
+                                            <p:cond delay="0"/>
+                                          </p:stCondLst>
+                                        </p:cTn>
+                                        <p:tgtEl>
+                                          <p:spTgt spid="10"/>
+                                        </p:tgtEl>
+                                        <p:attrNameLst>
+                                          <p:attrName>style.visibility</p:attrName>
+                                        </p:attrNameLst>
+                                      </p:cBhvr>
+                                      <p:to>
+                                        <p:strVal val="visible"/>
+                                      </p:to>
+                                    </p:set>
+                                  </p:childTnLst>
+                                </p:cTn>
+                              </p:par>
+                            </p:childTnLst>
+                          </p:cTn>
+                        </p:par>
+                      </p:childTnLst>
+                    </p:cTn>
+                  </p:par>
+                </p:childTnLst>
+              </p:cTn>
+              <p:prevCondLst>
+                <p:cond evt="onPrev" delay="0">
+                  <p:tgtEl>
+                    <p:sldTgt/>
+                  </p:tgtEl>
+                </p:cond>
+              </p:prevCondLst>
+              <p:nextCondLst>
+                <p:cond evt="onNext" delay="0">
+                  <p:tgtEl>
+                    <p:sldTgt/>
+                  </p:tgtEl>
+                </p:cond>
+              </p:nextCondLst>
+            </p:seq>
+          </p:childTnLst>
+        </p:cTn>
+      </p:par>
+    </p:tnLst>
+  </p:timing>
+</p:sld>
+</file>
+
+<file path=ppt/slides/slide11.xml><?xml version="1.0" encoding="utf-8"?>
+<p:sld xmlns:a="http://schemas.openxmlformats.org/drawingml/2006/main" xmlns:r="http://schemas.openxmlformats.org/officeDocument/2006/relationships" xmlns:p="http://schemas.openxmlformats.org/presentationml/2006/main">
+  <p:cSld>
+    <p:spTree>
+      <p:nvGrpSpPr>
+        <p:cNvPr id="1" name=""/>
+        <p:cNvGrpSpPr/>
+        <p:nvPr/>
+      </p:nvGrpSpPr>
+      <p:grpSpPr>
+        <a:xfrm>
+          <a:off x="0" y="0"/>
+          <a:ext cx="0" cy="0"/>
+          <a:chOff x="0" y="0"/>
+          <a:chExt cx="0" cy="0"/>
+        </a:xfrm>
+      </p:grpSpPr>
+      <p:pic>
+        <p:nvPicPr>
+          <p:cNvPr id="5" name="Picture 4"/>
+          <p:cNvPicPr>
+            <a:picLocks noChangeAspect="1"/>
+          </p:cNvPicPr>
+          <p:nvPr/>
+        </p:nvPicPr>
+        <p:blipFill>
+          <a:blip r:embed="rId2"/>
+          <a:stretch>
+            <a:fillRect/>
+          </a:stretch>
+        </p:blipFill>
+        <p:spPr>
+          <a:xfrm>
+            <a:off x="1" y="0"/>
+            <a:ext cx="2497014" cy="340863"/>
+          </a:xfrm>
+          <a:prstGeom prst="rect">
+            <a:avLst/>
+          </a:prstGeom>
+        </p:spPr>
+      </p:pic>
+      <p:pic>
+        <p:nvPicPr>
+          <p:cNvPr id="2" name="Picture 1"/>
+          <p:cNvPicPr>
+            <a:picLocks noChangeAspect="1"/>
+          </p:cNvPicPr>
+          <p:nvPr/>
+        </p:nvPicPr>
+        <p:blipFill>
+          <a:blip r:embed="rId3"/>
+          <a:stretch>
+            <a:fillRect/>
+          </a:stretch>
+        </p:blipFill>
+        <p:spPr>
+          <a:xfrm>
+            <a:off x="1153257" y="990600"/>
+            <a:ext cx="1704975" cy="295275"/>
+          </a:xfrm>
+          <a:prstGeom prst="rect">
+            <a:avLst/>
+          </a:prstGeom>
+        </p:spPr>
+      </p:pic>
+      <p:pic>
+        <p:nvPicPr>
+          <p:cNvPr id="16" name="Picture 15"/>
+          <p:cNvPicPr>
+            <a:picLocks noChangeAspect="1"/>
+          </p:cNvPicPr>
+          <p:nvPr/>
+        </p:nvPicPr>
+        <p:blipFill>
+          <a:blip r:embed="rId4"/>
+          <a:stretch>
+            <a:fillRect/>
+          </a:stretch>
+        </p:blipFill>
+        <p:spPr>
+          <a:xfrm>
+            <a:off x="4253281" y="1285875"/>
+            <a:ext cx="3028950" cy="1095375"/>
+          </a:xfrm>
+          <a:prstGeom prst="rect">
+            <a:avLst/>
+          </a:prstGeom>
+        </p:spPr>
+      </p:pic>
+      <p:pic>
+        <p:nvPicPr>
+          <p:cNvPr id="17" name="Picture 16"/>
+          <p:cNvPicPr>
+            <a:picLocks noChangeAspect="1"/>
+          </p:cNvPicPr>
+          <p:nvPr/>
+        </p:nvPicPr>
+        <p:blipFill>
+          <a:blip r:embed="rId5"/>
+          <a:stretch>
+            <a:fillRect/>
+          </a:stretch>
+        </p:blipFill>
+        <p:spPr>
+          <a:xfrm>
+            <a:off x="1258031" y="2904026"/>
+            <a:ext cx="1495425" cy="276225"/>
+          </a:xfrm>
+          <a:prstGeom prst="rect">
+            <a:avLst/>
+          </a:prstGeom>
+        </p:spPr>
+      </p:pic>
+      <p:pic>
+        <p:nvPicPr>
+          <p:cNvPr id="18" name="Picture 17"/>
+          <p:cNvPicPr>
+            <a:picLocks noChangeAspect="1"/>
+          </p:cNvPicPr>
+          <p:nvPr/>
+        </p:nvPicPr>
+        <p:blipFill>
+          <a:blip r:embed="rId6"/>
+          <a:stretch>
+            <a:fillRect/>
+          </a:stretch>
+        </p:blipFill>
+        <p:spPr>
+          <a:xfrm>
+            <a:off x="1687025" y="3542201"/>
+            <a:ext cx="6848475" cy="1695450"/>
+          </a:xfrm>
+          <a:prstGeom prst="rect">
+            <a:avLst/>
+          </a:prstGeom>
+        </p:spPr>
+      </p:pic>
+      <p:pic>
+        <p:nvPicPr>
+          <p:cNvPr id="19" name="Picture 18"/>
+          <p:cNvPicPr>
+            <a:picLocks noChangeAspect="1"/>
+          </p:cNvPicPr>
+          <p:nvPr/>
+        </p:nvPicPr>
+        <p:blipFill>
+          <a:blip r:embed="rId7"/>
+          <a:stretch>
+            <a:fillRect/>
+          </a:stretch>
+        </p:blipFill>
+        <p:spPr>
+          <a:xfrm>
+            <a:off x="5111262" y="5599601"/>
+            <a:ext cx="5857875" cy="238125"/>
+          </a:xfrm>
+          <a:prstGeom prst="rect">
+            <a:avLst/>
+          </a:prstGeom>
+        </p:spPr>
+      </p:pic>
+    </p:spTree>
+    <p:extLst>
+      <p:ext uri="{BB962C8B-B14F-4D97-AF65-F5344CB8AC3E}">
+        <p14:creationId xmlns:p14="http://schemas.microsoft.com/office/powerpoint/2010/main" val="1476405532"/>
+      </p:ext>
+    </p:extLst>
+  </p:cSld>
+  <p:clrMapOvr>
+    <a:masterClrMapping/>
+  </p:clrMapOvr>
+  <p:timing>
+    <p:tnLst>
+      <p:par>
+        <p:cTn id="1" dur="indefinite" restart="never" nodeType="tmRoot">
+          <p:childTnLst>
+            <p:seq concurrent="1" nextAc="seek">
+              <p:cTn id="2" dur="indefinite" nodeType="mainSeq">
+                <p:childTnLst>
+                  <p:par>
+                    <p:cTn id="3" fill="hold">
+                      <p:stCondLst>
+                        <p:cond delay="indefinite"/>
+                      </p:stCondLst>
+                      <p:childTnLst>
+                        <p:par>
+                          <p:cTn id="4" fill="hold">
+                            <p:stCondLst>
+                              <p:cond delay="0"/>
+                            </p:stCondLst>
+                            <p:childTnLst>
+                              <p:par>
+                                <p:cTn id="5" presetID="1" presetClass="entr" presetSubtype="0" fill="hold" nodeType="clickEffect">
+                                  <p:stCondLst>
+                                    <p:cond delay="0"/>
+                                  </p:stCondLst>
+                                  <p:childTnLst>
+                                    <p:set>
+                                      <p:cBhvr>
+                                        <p:cTn id="6" dur="1" fill="hold">
+                                          <p:stCondLst>
+                                            <p:cond delay="0"/>
+                                          </p:stCondLst>
+                                        </p:cTn>
+                                        <p:tgtEl>
+                                          <p:spTgt spid="18"/>
+                                        </p:tgtEl>
+                                        <p:attrNameLst>
+                                          <p:attrName>style.visibility</p:attrName>
+                                        </p:attrNameLst>
+                                      </p:cBhvr>
+                                      <p:to>
+                                        <p:strVal val="visible"/>
+                                      </p:to>
+                                    </p:set>
+                                  </p:childTnLst>
+                                </p:cTn>
+                              </p:par>
+                            </p:childTnLst>
+                          </p:cTn>
+                        </p:par>
+                      </p:childTnLst>
+                    </p:cTn>
+                  </p:par>
+                  <p:par>
+                    <p:cTn id="7" fill="hold">
+                      <p:stCondLst>
+                        <p:cond delay="indefinite"/>
+                      </p:stCondLst>
+                      <p:childTnLst>
+                        <p:par>
+                          <p:cTn id="8" fill="hold">
+                            <p:stCondLst>
+                              <p:cond delay="0"/>
+                            </p:stCondLst>
+                            <p:childTnLst>
+                              <p:par>
+                                <p:cTn id="9" presetID="1" presetClass="entr" presetSubtype="0" fill="hold" nodeType="clickEffect">
+                                  <p:stCondLst>
+                                    <p:cond delay="0"/>
+                                  </p:stCondLst>
+                                  <p:childTnLst>
+                                    <p:set>
+                                      <p:cBhvr>
+                                        <p:cTn id="10" dur="1" fill="hold">
+                                          <p:stCondLst>
+                                            <p:cond delay="0"/>
+                                          </p:stCondLst>
+                                        </p:cTn>
+                                        <p:tgtEl>
+                                          <p:spTgt spid="19"/>
+                                        </p:tgtEl>
+                                        <p:attrNameLst>
+                                          <p:attrName>style.visibility</p:attrName>
+                                        </p:attrNameLst>
+                                      </p:cBhvr>
+                                      <p:to>
+                                        <p:strVal val="visible"/>
+                                      </p:to>
+                                    </p:set>
+                                  </p:childTnLst>
+                                </p:cTn>
+                              </p:par>
+                            </p:childTnLst>
+                          </p:cTn>
+                        </p:par>
+                      </p:childTnLst>
+                    </p:cTn>
+                  </p:par>
+                </p:childTnLst>
+              </p:cTn>
+              <p:prevCondLst>
+                <p:cond evt="onPrev" delay="0">
+                  <p:tgtEl>
+                    <p:sldTgt/>
+                  </p:tgtEl>
+                </p:cond>
+              </p:prevCondLst>
+              <p:nextCondLst>
+                <p:cond evt="onNext" delay="0">
+                  <p:tgtEl>
+                    <p:sldTgt/>
+                  </p:tgtEl>
+                </p:cond>
+              </p:nextCondLst>
+            </p:seq>
+          </p:childTnLst>
+        </p:cTn>
+      </p:par>
+    </p:tnLst>
+  </p:timing>
+</p:sld>
+</file>
+
+<file path=ppt/slides/slide12.xml><?xml version="1.0" encoding="utf-8"?>
+<p:sld xmlns:a="http://schemas.openxmlformats.org/drawingml/2006/main" xmlns:r="http://schemas.openxmlformats.org/officeDocument/2006/relationships" xmlns:p="http://schemas.openxmlformats.org/presentationml/2006/main">
+  <p:cSld>
+    <p:spTree>
+      <p:nvGrpSpPr>
+        <p:cNvPr id="1" name=""/>
+        <p:cNvGrpSpPr/>
+        <p:nvPr/>
+      </p:nvGrpSpPr>
+      <p:grpSpPr>
+        <a:xfrm>
+          <a:off x="0" y="0"/>
+          <a:ext cx="0" cy="0"/>
+          <a:chOff x="0" y="0"/>
+          <a:chExt cx="0" cy="0"/>
+        </a:xfrm>
+      </p:grpSpPr>
+      <p:pic>
+        <p:nvPicPr>
+          <p:cNvPr id="5" name="Picture 4"/>
+          <p:cNvPicPr>
+            <a:picLocks noChangeAspect="1"/>
+          </p:cNvPicPr>
+          <p:nvPr/>
+        </p:nvPicPr>
+        <p:blipFill>
+          <a:blip r:embed="rId2"/>
+          <a:stretch>
+            <a:fillRect/>
+          </a:stretch>
+        </p:blipFill>
+        <p:spPr>
+          <a:xfrm>
+            <a:off x="1" y="0"/>
+            <a:ext cx="2497014" cy="340863"/>
+          </a:xfrm>
+          <a:prstGeom prst="rect">
+            <a:avLst/>
+          </a:prstGeom>
+        </p:spPr>
+      </p:pic>
+      <p:pic>
+        <p:nvPicPr>
+          <p:cNvPr id="3" name="Picture 2"/>
+          <p:cNvPicPr>
+            <a:picLocks noChangeAspect="1"/>
+          </p:cNvPicPr>
+          <p:nvPr/>
+        </p:nvPicPr>
+        <p:blipFill>
+          <a:blip r:embed="rId3"/>
+          <a:stretch>
+            <a:fillRect/>
+          </a:stretch>
+        </p:blipFill>
+        <p:spPr>
+          <a:xfrm>
+            <a:off x="1058740" y="1044819"/>
+            <a:ext cx="2876550" cy="266700"/>
+          </a:xfrm>
+          <a:prstGeom prst="rect">
+            <a:avLst/>
+          </a:prstGeom>
+        </p:spPr>
+      </p:pic>
+      <p:pic>
+        <p:nvPicPr>
+          <p:cNvPr id="4" name="Picture 3"/>
+          <p:cNvPicPr>
+            <a:picLocks noChangeAspect="1"/>
+          </p:cNvPicPr>
+          <p:nvPr/>
+        </p:nvPicPr>
+        <p:blipFill>
+          <a:blip r:embed="rId4"/>
+          <a:stretch>
+            <a:fillRect/>
+          </a:stretch>
+        </p:blipFill>
+        <p:spPr>
+          <a:xfrm>
+            <a:off x="4827710" y="962025"/>
+            <a:ext cx="6686550" cy="971550"/>
+          </a:xfrm>
+          <a:prstGeom prst="rect">
+            <a:avLst/>
+          </a:prstGeom>
+        </p:spPr>
+      </p:pic>
+      <p:pic>
+        <p:nvPicPr>
+          <p:cNvPr id="6" name="Picture 5"/>
+          <p:cNvPicPr>
+            <a:picLocks noChangeAspect="1"/>
+          </p:cNvPicPr>
+          <p:nvPr/>
+        </p:nvPicPr>
+        <p:blipFill>
+          <a:blip r:embed="rId5"/>
+          <a:stretch>
+            <a:fillRect/>
+          </a:stretch>
+        </p:blipFill>
+        <p:spPr>
+          <a:xfrm>
+            <a:off x="1401640" y="1822571"/>
+            <a:ext cx="2533650" cy="1266825"/>
+          </a:xfrm>
+          <a:prstGeom prst="rect">
+            <a:avLst/>
+          </a:prstGeom>
+        </p:spPr>
+      </p:pic>
+      <p:pic>
+        <p:nvPicPr>
+          <p:cNvPr id="7" name="Picture 6"/>
+          <p:cNvPicPr>
+            <a:picLocks noChangeAspect="1"/>
+          </p:cNvPicPr>
+          <p:nvPr/>
+        </p:nvPicPr>
+        <p:blipFill>
+          <a:blip r:embed="rId6"/>
+          <a:stretch>
+            <a:fillRect/>
+          </a:stretch>
+        </p:blipFill>
+        <p:spPr>
+          <a:xfrm>
+            <a:off x="1401640" y="3337047"/>
+            <a:ext cx="6000750" cy="1285875"/>
+          </a:xfrm>
+          <a:prstGeom prst="rect">
+            <a:avLst/>
+          </a:prstGeom>
+        </p:spPr>
+      </p:pic>
+      <p:pic>
+        <p:nvPicPr>
+          <p:cNvPr id="8" name="Picture 7"/>
+          <p:cNvPicPr>
+            <a:picLocks noChangeAspect="1"/>
+          </p:cNvPicPr>
+          <p:nvPr/>
+        </p:nvPicPr>
+        <p:blipFill>
+          <a:blip r:embed="rId7"/>
+          <a:stretch>
+            <a:fillRect/>
+          </a:stretch>
+        </p:blipFill>
+        <p:spPr>
+          <a:xfrm>
+            <a:off x="1401640" y="4843097"/>
+            <a:ext cx="6734175" cy="485775"/>
+          </a:xfrm>
+          <a:prstGeom prst="rect">
+            <a:avLst/>
+          </a:prstGeom>
+        </p:spPr>
+      </p:pic>
+      <p:pic>
+        <p:nvPicPr>
+          <p:cNvPr id="9" name="Picture 8"/>
+          <p:cNvPicPr>
+            <a:picLocks noChangeAspect="1"/>
+          </p:cNvPicPr>
+          <p:nvPr/>
+        </p:nvPicPr>
+        <p:blipFill>
+          <a:blip r:embed="rId8"/>
+          <a:stretch>
+            <a:fillRect/>
+          </a:stretch>
+        </p:blipFill>
+        <p:spPr>
+          <a:xfrm>
+            <a:off x="5327771" y="5791566"/>
+            <a:ext cx="6600825" cy="714375"/>
+          </a:xfrm>
+          <a:prstGeom prst="rect">
+            <a:avLst/>
+          </a:prstGeom>
+        </p:spPr>
+      </p:pic>
+    </p:spTree>
+    <p:extLst>
+      <p:ext uri="{BB962C8B-B14F-4D97-AF65-F5344CB8AC3E}">
+        <p14:creationId xmlns:p14="http://schemas.microsoft.com/office/powerpoint/2010/main" val="1512348110"/>
+      </p:ext>
+    </p:extLst>
+  </p:cSld>
+  <p:clrMapOvr>
+    <a:masterClrMapping/>
+  </p:clrMapOvr>
+  <p:timing>
+    <p:tnLst>
+      <p:par>
+        <p:cTn id="1" dur="indefinite" restart="never" nodeType="tmRoot">
+          <p:childTnLst>
+            <p:seq concurrent="1" nextAc="seek">
+              <p:cTn id="2" dur="indefinite" nodeType="mainSeq">
+                <p:childTnLst>
+                  <p:par>
+                    <p:cTn id="3" fill="hold">
+                      <p:stCondLst>
+                        <p:cond delay="indefinite"/>
+                      </p:stCondLst>
+                      <p:childTnLst>
+                        <p:par>
+                          <p:cTn id="4" fill="hold">
+                            <p:stCondLst>
+                              <p:cond delay="0"/>
+                            </p:stCondLst>
+                            <p:childTnLst>
+                              <p:par>
+                                <p:cTn id="5" presetID="1" presetClass="entr" presetSubtype="0" fill="hold" nodeType="clickEffect">
+                                  <p:stCondLst>
+                                    <p:cond delay="0"/>
+                                  </p:stCondLst>
+                                  <p:childTnLst>
+                                    <p:set>
+                                      <p:cBhvr>
+                                        <p:cTn id="6" dur="1" fill="hold">
+                                          <p:stCondLst>
+                                            <p:cond delay="0"/>
+                                          </p:stCondLst>
+                                        </p:cTn>
+                                        <p:tgtEl>
+                                          <p:spTgt spid="7"/>
+                                        </p:tgtEl>
+                                        <p:attrNameLst>
+                                          <p:attrName>style.visibility</p:attrName>
+                                        </p:attrNameLst>
+                                      </p:cBhvr>
+                                      <p:to>
+                                        <p:strVal val="visible"/>
+                                      </p:to>
+                                    </p:set>
+                                  </p:childTnLst>
+                                </p:cTn>
+                              </p:par>
+                            </p:childTnLst>
+                          </p:cTn>
+                        </p:par>
+                      </p:childTnLst>
+                    </p:cTn>
+                  </p:par>
+                  <p:par>
+                    <p:cTn id="7" fill="hold">
+                      <p:stCondLst>
+                        <p:cond delay="indefinite"/>
+                      </p:stCondLst>
+                      <p:childTnLst>
+                        <p:par>
+                          <p:cTn id="8" fill="hold">
+                            <p:stCondLst>
+                              <p:cond delay="0"/>
+                            </p:stCondLst>
+                            <p:childTnLst>
+                              <p:par>
+                                <p:cTn id="9" presetID="1" presetClass="entr" presetSubtype="0" fill="hold" nodeType="clickEffect">
+                                  <p:stCondLst>
+                                    <p:cond delay="0"/>
+                                  </p:stCondLst>
+                                  <p:childTnLst>
+                                    <p:set>
+                                      <p:cBhvr>
+                                        <p:cTn id="10" dur="1" fill="hold">
+                                          <p:stCondLst>
+                                            <p:cond delay="0"/>
+                                          </p:stCondLst>
+                                        </p:cTn>
+                                        <p:tgtEl>
+                                          <p:spTgt spid="8"/>
+                                        </p:tgtEl>
+                                        <p:attrNameLst>
+                                          <p:attrName>style.visibility</p:attrName>
+                                        </p:attrNameLst>
+                                      </p:cBhvr>
+                                      <p:to>
+                                        <p:strVal val="visible"/>
+                                      </p:to>
+                                    </p:set>
+                                  </p:childTnLst>
+                                </p:cTn>
+                              </p:par>
+                            </p:childTnLst>
+                          </p:cTn>
+                        </p:par>
+                      </p:childTnLst>
+                    </p:cTn>
+                  </p:par>
+                  <p:par>
+                    <p:cTn id="11" fill="hold">
+                      <p:stCondLst>
+                        <p:cond delay="indefinite"/>
+                      </p:stCondLst>
+                      <p:childTnLst>
+                        <p:par>
+                          <p:cTn id="12" fill="hold">
+                            <p:stCondLst>
+                              <p:cond delay="0"/>
+                            </p:stCondLst>
+                            <p:childTnLst>
+                              <p:par>
+                                <p:cTn id="13" presetID="1" presetClass="entr" presetSubtype="0" fill="hold" nodeType="clickEffect">
+                                  <p:stCondLst>
+                                    <p:cond delay="0"/>
+                                  </p:stCondLst>
+                                  <p:childTnLst>
+                                    <p:set>
+                                      <p:cBhvr>
+                                        <p:cTn id="14" dur="1" fill="hold">
+                                          <p:stCondLst>
+                                            <p:cond delay="0"/>
+                                          </p:stCondLst>
+                                        </p:cTn>
+                                        <p:tgtEl>
+                                          <p:spTgt spid="9"/>
+                                        </p:tgtEl>
+                                        <p:attrNameLst>
+                                          <p:attrName>style.visibility</p:attrName>
+                                        </p:attrNameLst>
+                                      </p:cBhvr>
+                                      <p:to>
+                                        <p:strVal val="visible"/>
+                                      </p:to>
+                                    </p:set>
+                                  </p:childTnLst>
+                                </p:cTn>
+                              </p:par>
+                            </p:childTnLst>
+                          </p:cTn>
+                        </p:par>
+                      </p:childTnLst>
+                    </p:cTn>
+                  </p:par>
+                </p:childTnLst>
+              </p:cTn>
+              <p:prevCondLst>
+                <p:cond evt="onPrev" delay="0">
+                  <p:tgtEl>
+                    <p:sldTgt/>
+                  </p:tgtEl>
+                </p:cond>
+              </p:prevCondLst>
+              <p:nextCondLst>
+                <p:cond evt="onNext" delay="0">
+                  <p:tgtEl>
+                    <p:sldTgt/>
+                  </p:tgtEl>
+                </p:cond>
+              </p:nextCondLst>
+            </p:seq>
+          </p:childTnLst>
+        </p:cTn>
+      </p:par>
+    </p:tnLst>
+  </p:timing>
+</p:sld>
+</file>
+
+<file path=ppt/slides/slide13.xml><?xml version="1.0" encoding="utf-8"?>
+<p:sld xmlns:a="http://schemas.openxmlformats.org/drawingml/2006/main" xmlns:r="http://schemas.openxmlformats.org/officeDocument/2006/relationships" xmlns:p="http://schemas.openxmlformats.org/presentationml/2006/main">
+  <p:cSld>
+    <p:spTree>
+      <p:nvGrpSpPr>
+        <p:cNvPr id="1" name=""/>
+        <p:cNvGrpSpPr/>
+        <p:nvPr/>
+      </p:nvGrpSpPr>
+      <p:grpSpPr>
+        <a:xfrm>
+          <a:off x="0" y="0"/>
+          <a:ext cx="0" cy="0"/>
+          <a:chOff x="0" y="0"/>
+          <a:chExt cx="0" cy="0"/>
+        </a:xfrm>
+      </p:grpSpPr>
+      <p:pic>
+        <p:nvPicPr>
+          <p:cNvPr id="5" name="Picture 4"/>
+          <p:cNvPicPr>
+            <a:picLocks noChangeAspect="1"/>
+          </p:cNvPicPr>
+          <p:nvPr/>
+        </p:nvPicPr>
+        <p:blipFill>
+          <a:blip r:embed="rId2"/>
+          <a:stretch>
+            <a:fillRect/>
+          </a:stretch>
+        </p:blipFill>
+        <p:spPr>
+          <a:xfrm>
+            <a:off x="1" y="0"/>
+            <a:ext cx="2497014" cy="340863"/>
+          </a:xfrm>
+          <a:prstGeom prst="rect">
+            <a:avLst/>
+          </a:prstGeom>
+        </p:spPr>
+      </p:pic>
+      <p:pic>
+        <p:nvPicPr>
+          <p:cNvPr id="2" name="Picture 1"/>
+          <p:cNvPicPr>
+            <a:picLocks noChangeAspect="1"/>
+          </p:cNvPicPr>
+          <p:nvPr/>
+        </p:nvPicPr>
+        <p:blipFill>
+          <a:blip r:embed="rId3"/>
+          <a:stretch>
+            <a:fillRect/>
+          </a:stretch>
+        </p:blipFill>
+        <p:spPr>
+          <a:xfrm>
+            <a:off x="1132009" y="827943"/>
+            <a:ext cx="2495550" cy="419100"/>
+          </a:xfrm>
+          <a:prstGeom prst="rect">
+            <a:avLst/>
+          </a:prstGeom>
+        </p:spPr>
+      </p:pic>
+      <p:pic>
+        <p:nvPicPr>
+          <p:cNvPr id="10" name="Picture 9"/>
+          <p:cNvPicPr>
+            <a:picLocks noChangeAspect="1"/>
+          </p:cNvPicPr>
+          <p:nvPr/>
+        </p:nvPicPr>
+        <p:blipFill>
+          <a:blip r:embed="rId4"/>
+          <a:stretch>
+            <a:fillRect/>
+          </a:stretch>
+        </p:blipFill>
+        <p:spPr>
+          <a:xfrm>
+            <a:off x="2379784" y="1571258"/>
+            <a:ext cx="6686550" cy="1019175"/>
+          </a:xfrm>
+          <a:prstGeom prst="rect">
+            <a:avLst/>
+          </a:prstGeom>
+        </p:spPr>
+      </p:pic>
+      <p:pic>
+        <p:nvPicPr>
+          <p:cNvPr id="11" name="Picture 10"/>
+          <p:cNvPicPr>
+            <a:picLocks noChangeAspect="1"/>
+          </p:cNvPicPr>
+          <p:nvPr/>
+        </p:nvPicPr>
+        <p:blipFill>
+          <a:blip r:embed="rId5"/>
+          <a:stretch>
+            <a:fillRect/>
+          </a:stretch>
+        </p:blipFill>
+        <p:spPr>
+          <a:xfrm>
+            <a:off x="1396878" y="2785694"/>
+            <a:ext cx="4638675" cy="1143000"/>
+          </a:xfrm>
+          <a:prstGeom prst="rect">
+            <a:avLst/>
+          </a:prstGeom>
+        </p:spPr>
+      </p:pic>
+      <p:pic>
+        <p:nvPicPr>
+          <p:cNvPr id="12" name="Picture 11"/>
+          <p:cNvPicPr>
+            <a:picLocks noChangeAspect="1"/>
+          </p:cNvPicPr>
+          <p:nvPr/>
+        </p:nvPicPr>
+        <p:blipFill>
+          <a:blip r:embed="rId6"/>
+          <a:stretch>
+            <a:fillRect/>
+          </a:stretch>
+        </p:blipFill>
+        <p:spPr>
+          <a:xfrm>
+            <a:off x="1396878" y="4737588"/>
+            <a:ext cx="4943475" cy="1181100"/>
+          </a:xfrm>
+          <a:prstGeom prst="rect">
+            <a:avLst/>
+          </a:prstGeom>
+        </p:spPr>
+      </p:pic>
+    </p:spTree>
+    <p:extLst>
+      <p:ext uri="{BB962C8B-B14F-4D97-AF65-F5344CB8AC3E}">
+        <p14:creationId xmlns:p14="http://schemas.microsoft.com/office/powerpoint/2010/main" val="2244475360"/>
+      </p:ext>
+    </p:extLst>
+  </p:cSld>
+  <p:clrMapOvr>
+    <a:masterClrMapping/>
+  </p:clrMapOvr>
+  <p:timing>
+    <p:tnLst>
+      <p:par>
+        <p:cTn id="1" dur="indefinite" restart="never" nodeType="tmRoot">
+          <p:childTnLst>
+            <p:seq concurrent="1" nextAc="seek">
+              <p:cTn id="2" dur="indefinite" nodeType="mainSeq">
+                <p:childTnLst>
+                  <p:par>
+                    <p:cTn id="3" fill="hold">
+                      <p:stCondLst>
+                        <p:cond delay="indefinite"/>
+                      </p:stCondLst>
+                      <p:childTnLst>
+                        <p:par>
+                          <p:cTn id="4" fill="hold">
+                            <p:stCondLst>
+                              <p:cond delay="0"/>
+                            </p:stCondLst>
+                            <p:childTnLst>
+                              <p:par>
+                                <p:cTn id="5" presetID="1" presetClass="entr" presetSubtype="0" fill="hold" nodeType="clickEffect">
+                                  <p:stCondLst>
+                                    <p:cond delay="0"/>
+                                  </p:stCondLst>
+                                  <p:childTnLst>
+                                    <p:set>
+                                      <p:cBhvr>
+                                        <p:cTn id="6" dur="1" fill="hold">
+                                          <p:stCondLst>
+                                            <p:cond delay="0"/>
+                                          </p:stCondLst>
+                                        </p:cTn>
+                                        <p:tgtEl>
+                                          <p:spTgt spid="11"/>
+                                        </p:tgtEl>
+                                        <p:attrNameLst>
+                                          <p:attrName>style.visibility</p:attrName>
+                                        </p:attrNameLst>
+                                      </p:cBhvr>
+                                      <p:to>
+                                        <p:strVal val="visible"/>
+                                      </p:to>
+                                    </p:set>
+                                  </p:childTnLst>
+                                </p:cTn>
+                              </p:par>
+                            </p:childTnLst>
+                          </p:cTn>
+                        </p:par>
+                      </p:childTnLst>
+                    </p:cTn>
+                  </p:par>
+                  <p:par>
+                    <p:cTn id="7" fill="hold">
+                      <p:stCondLst>
+                        <p:cond delay="indefinite"/>
+                      </p:stCondLst>
+                      <p:childTnLst>
+                        <p:par>
+                          <p:cTn id="8" fill="hold">
+                            <p:stCondLst>
+                              <p:cond delay="0"/>
+                            </p:stCondLst>
+                            <p:childTnLst>
+                              <p:par>
+                                <p:cTn id="9" presetID="1" presetClass="entr" presetSubtype="0" fill="hold" nodeType="clickEffect">
+                                  <p:stCondLst>
+                                    <p:cond delay="0"/>
+                                  </p:stCondLst>
+                                  <p:childTnLst>
+                                    <p:set>
+                                      <p:cBhvr>
+                                        <p:cTn id="10" dur="1" fill="hold">
+                                          <p:stCondLst>
+                                            <p:cond delay="0"/>
+                                          </p:stCondLst>
+                                        </p:cTn>
+                                        <p:tgtEl>
+                                          <p:spTgt spid="12"/>
+                                        </p:tgtEl>
+                                        <p:attrNameLst>
+                                          <p:attrName>style.visibility</p:attrName>
+                                        </p:attrNameLst>
+                                      </p:cBhvr>
+                                      <p:to>
+                                        <p:strVal val="visible"/>
+                                      </p:to>
+                                    </p:set>
+                                  </p:childTnLst>
+                                </p:cTn>
+                              </p:par>
+                            </p:childTnLst>
+                          </p:cTn>
+                        </p:par>
+                      </p:childTnLst>
+                    </p:cTn>
+                  </p:par>
+                </p:childTnLst>
+              </p:cTn>
+              <p:prevCondLst>
+                <p:cond evt="onPrev" delay="0">
+                  <p:tgtEl>
+                    <p:sldTgt/>
+                  </p:tgtEl>
+                </p:cond>
+              </p:prevCondLst>
+              <p:nextCondLst>
+                <p:cond evt="onNext" delay="0">
+                  <p:tgtEl>
+                    <p:sldTgt/>
+                  </p:tgtEl>
+                </p:cond>
+              </p:nextCondLst>
+            </p:seq>
+          </p:childTnLst>
+        </p:cTn>
+      </p:par>
+    </p:tnLst>
+  </p:timing>
+</p:sld>
+</file>
+
+<file path=ppt/slides/slide14.xml><?xml version="1.0" encoding="utf-8"?>
+<p:sld xmlns:a="http://schemas.openxmlformats.org/drawingml/2006/main" xmlns:r="http://schemas.openxmlformats.org/officeDocument/2006/relationships" xmlns:p="http://schemas.openxmlformats.org/presentationml/2006/main">
+  <p:cSld>
+    <p:spTree>
+      <p:nvGrpSpPr>
+        <p:cNvPr id="1" name=""/>
+        <p:cNvGrpSpPr/>
+        <p:nvPr/>
+      </p:nvGrpSpPr>
+      <p:grpSpPr>
+        <a:xfrm>
+          <a:off x="0" y="0"/>
+          <a:ext cx="0" cy="0"/>
+          <a:chOff x="0" y="0"/>
+          <a:chExt cx="0" cy="0"/>
+        </a:xfrm>
+      </p:grpSpPr>
+      <p:pic>
+        <p:nvPicPr>
+          <p:cNvPr id="5" name="Picture 4"/>
+          <p:cNvPicPr>
+            <a:picLocks noChangeAspect="1"/>
+          </p:cNvPicPr>
+          <p:nvPr/>
+        </p:nvPicPr>
+        <p:blipFill>
+          <a:blip r:embed="rId2"/>
+          <a:stretch>
+            <a:fillRect/>
+          </a:stretch>
+        </p:blipFill>
+        <p:spPr>
+          <a:xfrm>
+            <a:off x="1" y="0"/>
+            <a:ext cx="2497014" cy="340863"/>
+          </a:xfrm>
+          <a:prstGeom prst="rect">
+            <a:avLst/>
+          </a:prstGeom>
+        </p:spPr>
+      </p:pic>
+      <p:pic>
+        <p:nvPicPr>
+          <p:cNvPr id="3" name="Picture 2"/>
+          <p:cNvPicPr>
+            <a:picLocks noChangeAspect="1"/>
+          </p:cNvPicPr>
+          <p:nvPr/>
+        </p:nvPicPr>
+        <p:blipFill>
+          <a:blip r:embed="rId3"/>
+          <a:stretch>
+            <a:fillRect/>
+          </a:stretch>
+        </p:blipFill>
+        <p:spPr>
+          <a:xfrm>
+            <a:off x="1291367" y="3132992"/>
+            <a:ext cx="1895475" cy="400050"/>
+          </a:xfrm>
+          <a:prstGeom prst="rect">
+            <a:avLst/>
+          </a:prstGeom>
+        </p:spPr>
+      </p:pic>
+      <p:pic>
+        <p:nvPicPr>
+          <p:cNvPr id="4" name="Picture 3"/>
+          <p:cNvPicPr>
+            <a:picLocks noChangeAspect="1"/>
+          </p:cNvPicPr>
+          <p:nvPr/>
+        </p:nvPicPr>
+        <p:blipFill>
+          <a:blip r:embed="rId4"/>
+          <a:stretch>
+            <a:fillRect/>
+          </a:stretch>
+        </p:blipFill>
+        <p:spPr>
+          <a:xfrm>
+            <a:off x="1244477" y="912934"/>
+            <a:ext cx="2505075" cy="342900"/>
+          </a:xfrm>
+          <a:prstGeom prst="rect">
+            <a:avLst/>
+          </a:prstGeom>
+        </p:spPr>
+      </p:pic>
+      <p:pic>
+        <p:nvPicPr>
+          <p:cNvPr id="6" name="Picture 5"/>
+          <p:cNvPicPr>
+            <a:picLocks noChangeAspect="1"/>
+          </p:cNvPicPr>
+          <p:nvPr/>
+        </p:nvPicPr>
+        <p:blipFill>
+          <a:blip r:embed="rId5"/>
+          <a:stretch>
+            <a:fillRect/>
+          </a:stretch>
+        </p:blipFill>
+        <p:spPr>
+          <a:xfrm>
+            <a:off x="1501651" y="1594338"/>
+            <a:ext cx="1990725" cy="1200150"/>
+          </a:xfrm>
+          <a:prstGeom prst="rect">
+            <a:avLst/>
+          </a:prstGeom>
+        </p:spPr>
+      </p:pic>
+      <p:pic>
+        <p:nvPicPr>
+          <p:cNvPr id="7" name="Picture 6"/>
+          <p:cNvPicPr>
+            <a:picLocks noChangeAspect="1"/>
+          </p:cNvPicPr>
+          <p:nvPr/>
+        </p:nvPicPr>
+        <p:blipFill>
+          <a:blip r:embed="rId6"/>
+          <a:stretch>
+            <a:fillRect/>
+          </a:stretch>
+        </p:blipFill>
+        <p:spPr>
+          <a:xfrm>
+            <a:off x="4659557" y="2362933"/>
+            <a:ext cx="2028825" cy="209550"/>
+          </a:xfrm>
+          <a:prstGeom prst="rect">
+            <a:avLst/>
+          </a:prstGeom>
+        </p:spPr>
+      </p:pic>
+      <p:pic>
+        <p:nvPicPr>
+          <p:cNvPr id="8" name="Picture 7"/>
+          <p:cNvPicPr>
+            <a:picLocks noChangeAspect="1"/>
+          </p:cNvPicPr>
+          <p:nvPr/>
+        </p:nvPicPr>
+        <p:blipFill>
+          <a:blip r:embed="rId7"/>
+          <a:stretch>
+            <a:fillRect/>
+          </a:stretch>
+        </p:blipFill>
+        <p:spPr>
+          <a:xfrm>
+            <a:off x="5069131" y="1837958"/>
+            <a:ext cx="904875" cy="180975"/>
+          </a:xfrm>
+          <a:prstGeom prst="rect">
+            <a:avLst/>
+          </a:prstGeom>
+        </p:spPr>
+      </p:pic>
+      <p:pic>
+        <p:nvPicPr>
+          <p:cNvPr id="9" name="Picture 8"/>
+          <p:cNvPicPr>
+            <a:picLocks noChangeAspect="1"/>
+          </p:cNvPicPr>
+          <p:nvPr/>
+        </p:nvPicPr>
+        <p:blipFill>
+          <a:blip r:embed="rId8"/>
+          <a:stretch>
+            <a:fillRect/>
+          </a:stretch>
+        </p:blipFill>
+        <p:spPr>
+          <a:xfrm>
+            <a:off x="7855563" y="1637200"/>
+            <a:ext cx="2066925" cy="1114425"/>
+          </a:xfrm>
+          <a:prstGeom prst="rect">
+            <a:avLst/>
+          </a:prstGeom>
+        </p:spPr>
+      </p:pic>
+      <p:pic>
+        <p:nvPicPr>
+          <p:cNvPr id="13" name="Picture 12"/>
+          <p:cNvPicPr>
+            <a:picLocks noChangeAspect="1"/>
+          </p:cNvPicPr>
+          <p:nvPr/>
+        </p:nvPicPr>
+        <p:blipFill>
+          <a:blip r:embed="rId9"/>
+          <a:stretch>
+            <a:fillRect/>
+          </a:stretch>
+        </p:blipFill>
+        <p:spPr>
+          <a:xfrm>
+            <a:off x="3930893" y="3491645"/>
+            <a:ext cx="3181350" cy="695325"/>
+          </a:xfrm>
+          <a:prstGeom prst="rect">
+            <a:avLst/>
+          </a:prstGeom>
+        </p:spPr>
+      </p:pic>
+      <p:pic>
+        <p:nvPicPr>
+          <p:cNvPr id="14" name="Picture 13"/>
+          <p:cNvPicPr>
+            <a:picLocks noChangeAspect="1"/>
+          </p:cNvPicPr>
+          <p:nvPr/>
+        </p:nvPicPr>
+        <p:blipFill>
+          <a:blip r:embed="rId10"/>
+          <a:stretch>
+            <a:fillRect/>
+          </a:stretch>
+        </p:blipFill>
+        <p:spPr>
+          <a:xfrm>
+            <a:off x="1494692" y="4597278"/>
+            <a:ext cx="2295525" cy="1971675"/>
+          </a:xfrm>
+          <a:prstGeom prst="rect">
+            <a:avLst/>
+          </a:prstGeom>
+        </p:spPr>
+      </p:pic>
+      <p:pic>
+        <p:nvPicPr>
+          <p:cNvPr id="15" name="Picture 14"/>
+          <p:cNvPicPr>
+            <a:picLocks noChangeAspect="1"/>
+          </p:cNvPicPr>
+          <p:nvPr/>
+        </p:nvPicPr>
+        <p:blipFill>
+          <a:blip r:embed="rId11"/>
+          <a:stretch>
+            <a:fillRect/>
+          </a:stretch>
+        </p:blipFill>
+        <p:spPr>
+          <a:xfrm>
+            <a:off x="7889632" y="5164381"/>
+            <a:ext cx="1981200" cy="1171575"/>
+          </a:xfrm>
+          <a:prstGeom prst="rect">
+            <a:avLst/>
+          </a:prstGeom>
+        </p:spPr>
+      </p:pic>
+    </p:spTree>
+    <p:extLst>
+      <p:ext uri="{BB962C8B-B14F-4D97-AF65-F5344CB8AC3E}">
+        <p14:creationId xmlns:p14="http://schemas.microsoft.com/office/powerpoint/2010/main" val="3969043455"/>
+      </p:ext>
+    </p:extLst>
+  </p:cSld>
+  <p:clrMapOvr>
+    <a:masterClrMapping/>
+  </p:clrMapOvr>
+  <p:timing>
+    <p:tnLst>
+      <p:par>
+        <p:cTn id="1" dur="indefinite" restart="never" nodeType="tmRoot">
+          <p:childTnLst>
+            <p:seq concurrent="1" nextAc="seek">
+              <p:cTn id="2" dur="indefinite" nodeType="mainSeq">
+                <p:childTnLst>
+                  <p:par>
+                    <p:cTn id="3" fill="hold">
+                      <p:stCondLst>
+                        <p:cond delay="indefinite"/>
+                      </p:stCondLst>
+                      <p:childTnLst>
+                        <p:par>
+                          <p:cTn id="4" fill="hold">
+                            <p:stCondLst>
+                              <p:cond delay="0"/>
+                            </p:stCondLst>
+                            <p:childTnLst>
+                              <p:par>
+                                <p:cTn id="5" presetID="1" presetClass="entr" presetSubtype="0" fill="hold" nodeType="clickEffect">
+                                  <p:stCondLst>
+                                    <p:cond delay="0"/>
+                                  </p:stCondLst>
+                                  <p:childTnLst>
+                                    <p:set>
+                                      <p:cBhvr>
+                                        <p:cTn id="6" dur="1" fill="hold">
+                                          <p:stCondLst>
+                                            <p:cond delay="0"/>
+                                          </p:stCondLst>
+                                        </p:cTn>
+                                        <p:tgtEl>
+                                          <p:spTgt spid="7"/>
+                                        </p:tgtEl>
+                                        <p:attrNameLst>
+                                          <p:attrName>style.visibility</p:attrName>
+                                        </p:attrNameLst>
+                                      </p:cBhvr>
+                                      <p:to>
+                                        <p:strVal val="visible"/>
+                                      </p:to>
+                                    </p:set>
+                                  </p:childTnLst>
+                                </p:cTn>
+                              </p:par>
+                              <p:par>
+                                <p:cTn id="7" presetID="1" presetClass="entr" presetSubtype="0" fill="hold" nodeType="withEffect">
+                                  <p:stCondLst>
+                                    <p:cond delay="0"/>
+                                  </p:stCondLst>
+                                  <p:childTnLst>
+                                    <p:set>
+                                      <p:cBhvr>
+                                        <p:cTn id="8" dur="1" fill="hold">
+                                          <p:stCondLst>
+                                            <p:cond delay="0"/>
+                                          </p:stCondLst>
+                                        </p:cTn>
+                                        <p:tgtEl>
+                                          <p:spTgt spid="8"/>
+                                        </p:tgtEl>
+                                        <p:attrNameLst>
+                                          <p:attrName>style.visibility</p:attrName>
+                                        </p:attrNameLst>
+                                      </p:cBhvr>
+                                      <p:to>
+                                        <p:strVal val="visible"/>
+                                      </p:to>
+                                    </p:set>
+                                  </p:childTnLst>
+                                </p:cTn>
+                              </p:par>
+                            </p:childTnLst>
+                          </p:cTn>
+                        </p:par>
+                      </p:childTnLst>
+                    </p:cTn>
+                  </p:par>
+                  <p:par>
+                    <p:cTn id="9" fill="hold">
+                      <p:stCondLst>
+                        <p:cond delay="indefinite"/>
+                      </p:stCondLst>
+                      <p:childTnLst>
+                        <p:par>
+                          <p:cTn id="10" fill="hold">
+                            <p:stCondLst>
+                              <p:cond delay="0"/>
+                            </p:stCondLst>
+                            <p:childTnLst>
+                              <p:par>
+                                <p:cTn id="11" presetID="1" presetClass="entr" presetSubtype="0" fill="hold" nodeType="clickEffect">
+                                  <p:stCondLst>
+                                    <p:cond delay="0"/>
+                                  </p:stCondLst>
+                                  <p:childTnLst>
+                                    <p:set>
+                                      <p:cBhvr>
+                                        <p:cTn id="12" dur="1" fill="hold">
+                                          <p:stCondLst>
+                                            <p:cond delay="0"/>
+                                          </p:stCondLst>
+                                        </p:cTn>
+                                        <p:tgtEl>
+                                          <p:spTgt spid="9"/>
+                                        </p:tgtEl>
+                                        <p:attrNameLst>
+                                          <p:attrName>style.visibility</p:attrName>
+                                        </p:attrNameLst>
+                                      </p:cBhvr>
+                                      <p:to>
+                                        <p:strVal val="visible"/>
+                                      </p:to>
+                                    </p:set>
+                                  </p:childTnLst>
+                                </p:cTn>
+                              </p:par>
+                            </p:childTnLst>
+                          </p:cTn>
+                        </p:par>
+                      </p:childTnLst>
+                    </p:cTn>
+                  </p:par>
+                  <p:par>
+                    <p:cTn id="13" fill="hold">
+                      <p:stCondLst>
+                        <p:cond delay="indefinite"/>
+                      </p:stCondLst>
+                      <p:childTnLst>
+                        <p:par>
+                          <p:cTn id="14" fill="hold">
+                            <p:stCondLst>
+                              <p:cond delay="0"/>
+                            </p:stCondLst>
+                            <p:childTnLst>
+                              <p:par>
+                                <p:cTn id="15" presetID="1" presetClass="entr" presetSubtype="0" fill="hold" nodeType="clickEffect">
+                                  <p:stCondLst>
+                                    <p:cond delay="0"/>
+                                  </p:stCondLst>
+                                  <p:childTnLst>
+                                    <p:set>
+                                      <p:cBhvr>
+                                        <p:cTn id="16" dur="1" fill="hold">
+                                          <p:stCondLst>
+                                            <p:cond delay="0"/>
+                                          </p:stCondLst>
+                                        </p:cTn>
+                                        <p:tgtEl>
+                                          <p:spTgt spid="3"/>
+                                        </p:tgtEl>
+                                        <p:attrNameLst>
+                                          <p:attrName>style.visibility</p:attrName>
+                                        </p:attrNameLst>
+                                      </p:cBhvr>
+                                      <p:to>
+                                        <p:strVal val="visible"/>
+                                      </p:to>
+                                    </p:set>
+                                  </p:childTnLst>
+                                </p:cTn>
+                              </p:par>
+                              <p:par>
+                                <p:cTn id="17" presetID="1" presetClass="entr" presetSubtype="0" fill="hold" nodeType="withEffect">
+                                  <p:stCondLst>
+                                    <p:cond delay="0"/>
+                                  </p:stCondLst>
+                                  <p:childTnLst>
+                                    <p:set>
+                                      <p:cBhvr>
+                                        <p:cTn id="18" dur="1" fill="hold">
+                                          <p:stCondLst>
+                                            <p:cond delay="0"/>
+                                          </p:stCondLst>
+                                        </p:cTn>
+                                        <p:tgtEl>
+                                          <p:spTgt spid="13"/>
+                                        </p:tgtEl>
+                                        <p:attrNameLst>
+                                          <p:attrName>style.visibility</p:attrName>
+                                        </p:attrNameLst>
+                                      </p:cBhvr>
+                                      <p:to>
+                                        <p:strVal val="visible"/>
+                                      </p:to>
+                                    </p:set>
+                                  </p:childTnLst>
+                                </p:cTn>
+                              </p:par>
+                            </p:childTnLst>
+                          </p:cTn>
+                        </p:par>
+                      </p:childTnLst>
+                    </p:cTn>
+                  </p:par>
+                  <p:par>
+                    <p:cTn id="19" fill="hold">
+                      <p:stCondLst>
+                        <p:cond delay="indefinite"/>
+                      </p:stCondLst>
+                      <p:childTnLst>
+                        <p:par>
+                          <p:cTn id="20" fill="hold">
+                            <p:stCondLst>
+                              <p:cond delay="0"/>
+                            </p:stCondLst>
+                            <p:childTnLst>
+                              <p:par>
+                                <p:cTn id="21" presetID="1" presetClass="entr" presetSubtype="0" fill="hold" nodeType="clickEffect">
+                                  <p:stCondLst>
+                                    <p:cond delay="0"/>
+                                  </p:stCondLst>
+                                  <p:childTnLst>
+                                    <p:set>
+                                      <p:cBhvr>
+                                        <p:cTn id="22" dur="1" fill="hold">
+                                          <p:stCondLst>
+                                            <p:cond delay="0"/>
+                                          </p:stCondLst>
+                                        </p:cTn>
+                                        <p:tgtEl>
+                                          <p:spTgt spid="14"/>
+                                        </p:tgtEl>
+                                        <p:attrNameLst>
+                                          <p:attrName>style.visibility</p:attrName>
+                                        </p:attrNameLst>
+                                      </p:cBhvr>
+                                      <p:to>
+                                        <p:strVal val="visible"/>
+                                      </p:to>
+                                    </p:set>
+                                  </p:childTnLst>
+                                </p:cTn>
+                              </p:par>
+                            </p:childTnLst>
+                          </p:cTn>
+                        </p:par>
+                      </p:childTnLst>
+                    </p:cTn>
+                  </p:par>
+                  <p:par>
+                    <p:cTn id="23" fill="hold">
+                      <p:stCondLst>
+                        <p:cond delay="indefinite"/>
+                      </p:stCondLst>
+                      <p:childTnLst>
+                        <p:par>
+                          <p:cTn id="24" fill="hold">
+                            <p:stCondLst>
+                              <p:cond delay="0"/>
+                            </p:stCondLst>
+                            <p:childTnLst>
+                              <p:par>
+                                <p:cTn id="25" presetID="1" presetClass="entr" presetSubtype="0" fill="hold" nodeType="clickEffect">
+                                  <p:stCondLst>
+                                    <p:cond delay="0"/>
+                                  </p:stCondLst>
+                                  <p:childTnLst>
+                                    <p:set>
+                                      <p:cBhvr>
+                                        <p:cTn id="26" dur="1" fill="hold">
+                                          <p:stCondLst>
+                                            <p:cond delay="0"/>
+                                          </p:stCondLst>
+                                        </p:cTn>
+                                        <p:tgtEl>
+                                          <p:spTgt spid="15"/>
+                                        </p:tgtEl>
+                                        <p:attrNameLst>
+                                          <p:attrName>style.visibility</p:attrName>
+                                        </p:attrNameLst>
+                                      </p:cBhvr>
+                                      <p:to>
+                                        <p:strVal val="visible"/>
+                                      </p:to>
+                                    </p:set>
+                                  </p:childTnLst>
+                                </p:cTn>
+                              </p:par>
+                            </p:childTnLst>
+                          </p:cTn>
+                        </p:par>
+                      </p:childTnLst>
+                    </p:cTn>
+                  </p:par>
+                </p:childTnLst>
+              </p:cTn>
+              <p:prevCondLst>
+                <p:cond evt="onPrev" delay="0">
+                  <p:tgtEl>
+                    <p:sldTgt/>
+                  </p:tgtEl>
+                </p:cond>
+              </p:prevCondLst>
+              <p:nextCondLst>
+                <p:cond evt="onNext" delay="0">
+                  <p:tgtEl>
+                    <p:sldTgt/>
+                  </p:tgtEl>
+                </p:cond>
+              </p:nextCondLst>
+            </p:seq>
+          </p:childTnLst>
+        </p:cTn>
       </p:par>
     </p:tnLst>
   </p:timing>
@@ -5293,6 +7145,765 @@
 </p:sld>
 </file>
 
+<file path=ppt/slides/slide8.xml><?xml version="1.0" encoding="utf-8"?>
+<p:sld xmlns:a="http://schemas.openxmlformats.org/drawingml/2006/main" xmlns:r="http://schemas.openxmlformats.org/officeDocument/2006/relationships" xmlns:p="http://schemas.openxmlformats.org/presentationml/2006/main">
+  <p:cSld>
+    <p:spTree>
+      <p:nvGrpSpPr>
+        <p:cNvPr id="1" name=""/>
+        <p:cNvGrpSpPr/>
+        <p:nvPr/>
+      </p:nvGrpSpPr>
+      <p:grpSpPr>
+        <a:xfrm>
+          <a:off x="0" y="0"/>
+          <a:ext cx="0" cy="0"/>
+          <a:chOff x="0" y="0"/>
+          <a:chExt cx="0" cy="0"/>
+        </a:xfrm>
+      </p:grpSpPr>
+      <p:pic>
+        <p:nvPicPr>
+          <p:cNvPr id="5" name="Picture 4"/>
+          <p:cNvPicPr>
+            <a:picLocks noChangeAspect="1"/>
+          </p:cNvPicPr>
+          <p:nvPr/>
+        </p:nvPicPr>
+        <p:blipFill>
+          <a:blip r:embed="rId2"/>
+          <a:stretch>
+            <a:fillRect/>
+          </a:stretch>
+        </p:blipFill>
+        <p:spPr>
+          <a:xfrm>
+            <a:off x="1" y="0"/>
+            <a:ext cx="2497014" cy="340863"/>
+          </a:xfrm>
+          <a:prstGeom prst="rect">
+            <a:avLst/>
+          </a:prstGeom>
+        </p:spPr>
+      </p:pic>
+      <p:pic>
+        <p:nvPicPr>
+          <p:cNvPr id="6" name="Picture 5"/>
+          <p:cNvPicPr>
+            <a:picLocks noChangeAspect="1"/>
+          </p:cNvPicPr>
+          <p:nvPr/>
+        </p:nvPicPr>
+        <p:blipFill>
+          <a:blip r:embed="rId3"/>
+          <a:stretch>
+            <a:fillRect/>
+          </a:stretch>
+        </p:blipFill>
+        <p:spPr>
+          <a:xfrm>
+            <a:off x="1045552" y="1255468"/>
+            <a:ext cx="1543050" cy="314325"/>
+          </a:xfrm>
+          <a:prstGeom prst="rect">
+            <a:avLst/>
+          </a:prstGeom>
+        </p:spPr>
+      </p:pic>
+      <p:pic>
+        <p:nvPicPr>
+          <p:cNvPr id="8" name="Picture 7"/>
+          <p:cNvPicPr>
+            <a:picLocks noChangeAspect="1"/>
+          </p:cNvPicPr>
+          <p:nvPr/>
+        </p:nvPicPr>
+        <p:blipFill>
+          <a:blip r:embed="rId4"/>
+          <a:stretch>
+            <a:fillRect/>
+          </a:stretch>
+        </p:blipFill>
+        <p:spPr>
+          <a:xfrm>
+            <a:off x="2270979" y="1941472"/>
+            <a:ext cx="3171825" cy="723900"/>
+          </a:xfrm>
+          <a:prstGeom prst="rect">
+            <a:avLst/>
+          </a:prstGeom>
+        </p:spPr>
+      </p:pic>
+      <p:pic>
+        <p:nvPicPr>
+          <p:cNvPr id="9" name="Picture 8"/>
+          <p:cNvPicPr>
+            <a:picLocks noChangeAspect="1"/>
+          </p:cNvPicPr>
+          <p:nvPr/>
+        </p:nvPicPr>
+        <p:blipFill>
+          <a:blip r:embed="rId5"/>
+          <a:stretch>
+            <a:fillRect/>
+          </a:stretch>
+        </p:blipFill>
+        <p:spPr>
+          <a:xfrm>
+            <a:off x="2270979" y="2898163"/>
+            <a:ext cx="4067175" cy="209550"/>
+          </a:xfrm>
+          <a:prstGeom prst="rect">
+            <a:avLst/>
+          </a:prstGeom>
+        </p:spPr>
+      </p:pic>
+      <p:pic>
+        <p:nvPicPr>
+          <p:cNvPr id="10" name="Picture 9"/>
+          <p:cNvPicPr>
+            <a:picLocks noChangeAspect="1"/>
+          </p:cNvPicPr>
+          <p:nvPr/>
+        </p:nvPicPr>
+        <p:blipFill>
+          <a:blip r:embed="rId6"/>
+          <a:stretch>
+            <a:fillRect/>
+          </a:stretch>
+        </p:blipFill>
+        <p:spPr>
+          <a:xfrm>
+            <a:off x="6997943" y="2888638"/>
+            <a:ext cx="704850" cy="228600"/>
+          </a:xfrm>
+          <a:prstGeom prst="rect">
+            <a:avLst/>
+          </a:prstGeom>
+        </p:spPr>
+      </p:pic>
+      <p:pic>
+        <p:nvPicPr>
+          <p:cNvPr id="11" name="Picture 10"/>
+          <p:cNvPicPr>
+            <a:picLocks noChangeAspect="1"/>
+          </p:cNvPicPr>
+          <p:nvPr/>
+        </p:nvPicPr>
+        <p:blipFill>
+          <a:blip r:embed="rId7"/>
+          <a:stretch>
+            <a:fillRect/>
+          </a:stretch>
+        </p:blipFill>
+        <p:spPr>
+          <a:xfrm>
+            <a:off x="2698872" y="4848590"/>
+            <a:ext cx="6677025" cy="466725"/>
+          </a:xfrm>
+          <a:prstGeom prst="rect">
+            <a:avLst/>
+          </a:prstGeom>
+        </p:spPr>
+      </p:pic>
+    </p:spTree>
+    <p:extLst>
+      <p:ext uri="{BB962C8B-B14F-4D97-AF65-F5344CB8AC3E}">
+        <p14:creationId xmlns:p14="http://schemas.microsoft.com/office/powerpoint/2010/main" val="4051973626"/>
+      </p:ext>
+    </p:extLst>
+  </p:cSld>
+  <p:clrMapOvr>
+    <a:masterClrMapping/>
+  </p:clrMapOvr>
+  <p:timing>
+    <p:tnLst>
+      <p:par>
+        <p:cTn id="1" dur="indefinite" restart="never" nodeType="tmRoot">
+          <p:childTnLst>
+            <p:seq concurrent="1" nextAc="seek">
+              <p:cTn id="2" dur="indefinite" nodeType="mainSeq">
+                <p:childTnLst>
+                  <p:par>
+                    <p:cTn id="3" fill="hold">
+                      <p:stCondLst>
+                        <p:cond delay="indefinite"/>
+                      </p:stCondLst>
+                      <p:childTnLst>
+                        <p:par>
+                          <p:cTn id="4" fill="hold">
+                            <p:stCondLst>
+                              <p:cond delay="0"/>
+                            </p:stCondLst>
+                            <p:childTnLst>
+                              <p:par>
+                                <p:cTn id="5" presetID="1" presetClass="entr" presetSubtype="0" fill="hold" nodeType="clickEffect">
+                                  <p:stCondLst>
+                                    <p:cond delay="0"/>
+                                  </p:stCondLst>
+                                  <p:childTnLst>
+                                    <p:set>
+                                      <p:cBhvr>
+                                        <p:cTn id="6" dur="1" fill="hold">
+                                          <p:stCondLst>
+                                            <p:cond delay="0"/>
+                                          </p:stCondLst>
+                                        </p:cTn>
+                                        <p:tgtEl>
+                                          <p:spTgt spid="11"/>
+                                        </p:tgtEl>
+                                        <p:attrNameLst>
+                                          <p:attrName>style.visibility</p:attrName>
+                                        </p:attrNameLst>
+                                      </p:cBhvr>
+                                      <p:to>
+                                        <p:strVal val="visible"/>
+                                      </p:to>
+                                    </p:set>
+                                  </p:childTnLst>
+                                </p:cTn>
+                              </p:par>
+                            </p:childTnLst>
+                          </p:cTn>
+                        </p:par>
+                      </p:childTnLst>
+                    </p:cTn>
+                  </p:par>
+                </p:childTnLst>
+              </p:cTn>
+              <p:prevCondLst>
+                <p:cond evt="onPrev" delay="0">
+                  <p:tgtEl>
+                    <p:sldTgt/>
+                  </p:tgtEl>
+                </p:cond>
+              </p:prevCondLst>
+              <p:nextCondLst>
+                <p:cond evt="onNext" delay="0">
+                  <p:tgtEl>
+                    <p:sldTgt/>
+                  </p:tgtEl>
+                </p:cond>
+              </p:nextCondLst>
+            </p:seq>
+          </p:childTnLst>
+        </p:cTn>
+      </p:par>
+    </p:tnLst>
+  </p:timing>
+</p:sld>
+</file>
+
+<file path=ppt/slides/slide9.xml><?xml version="1.0" encoding="utf-8"?>
+<p:sld xmlns:a="http://schemas.openxmlformats.org/drawingml/2006/main" xmlns:r="http://schemas.openxmlformats.org/officeDocument/2006/relationships" xmlns:p="http://schemas.openxmlformats.org/presentationml/2006/main">
+  <p:cSld>
+    <p:spTree>
+      <p:nvGrpSpPr>
+        <p:cNvPr id="1" name=""/>
+        <p:cNvGrpSpPr/>
+        <p:nvPr/>
+      </p:nvGrpSpPr>
+      <p:grpSpPr>
+        <a:xfrm>
+          <a:off x="0" y="0"/>
+          <a:ext cx="0" cy="0"/>
+          <a:chOff x="0" y="0"/>
+          <a:chExt cx="0" cy="0"/>
+        </a:xfrm>
+      </p:grpSpPr>
+      <p:pic>
+        <p:nvPicPr>
+          <p:cNvPr id="5" name="Picture 4"/>
+          <p:cNvPicPr>
+            <a:picLocks noChangeAspect="1"/>
+          </p:cNvPicPr>
+          <p:nvPr/>
+        </p:nvPicPr>
+        <p:blipFill>
+          <a:blip r:embed="rId2"/>
+          <a:stretch>
+            <a:fillRect/>
+          </a:stretch>
+        </p:blipFill>
+        <p:spPr>
+          <a:xfrm>
+            <a:off x="1" y="0"/>
+            <a:ext cx="2497014" cy="340863"/>
+          </a:xfrm>
+          <a:prstGeom prst="rect">
+            <a:avLst/>
+          </a:prstGeom>
+        </p:spPr>
+      </p:pic>
+      <p:pic>
+        <p:nvPicPr>
+          <p:cNvPr id="2" name="Picture 1"/>
+          <p:cNvPicPr>
+            <a:picLocks noChangeAspect="1"/>
+          </p:cNvPicPr>
+          <p:nvPr/>
+        </p:nvPicPr>
+        <p:blipFill>
+          <a:blip r:embed="rId3"/>
+          <a:stretch>
+            <a:fillRect/>
+          </a:stretch>
+        </p:blipFill>
+        <p:spPr>
+          <a:xfrm>
+            <a:off x="1153257" y="990600"/>
+            <a:ext cx="1704975" cy="295275"/>
+          </a:xfrm>
+          <a:prstGeom prst="rect">
+            <a:avLst/>
+          </a:prstGeom>
+        </p:spPr>
+      </p:pic>
+      <p:pic>
+        <p:nvPicPr>
+          <p:cNvPr id="3" name="Picture 2"/>
+          <p:cNvPicPr>
+            <a:picLocks noChangeAspect="1"/>
+          </p:cNvPicPr>
+          <p:nvPr/>
+        </p:nvPicPr>
+        <p:blipFill>
+          <a:blip r:embed="rId4"/>
+          <a:stretch>
+            <a:fillRect/>
+          </a:stretch>
+        </p:blipFill>
+        <p:spPr>
+          <a:xfrm>
+            <a:off x="1153257" y="2128149"/>
+            <a:ext cx="3171825" cy="1152525"/>
+          </a:xfrm>
+          <a:prstGeom prst="rect">
+            <a:avLst/>
+          </a:prstGeom>
+        </p:spPr>
+      </p:pic>
+      <p:pic>
+        <p:nvPicPr>
+          <p:cNvPr id="4" name="Picture 3"/>
+          <p:cNvPicPr>
+            <a:picLocks noChangeAspect="1"/>
+          </p:cNvPicPr>
+          <p:nvPr/>
+        </p:nvPicPr>
+        <p:blipFill>
+          <a:blip r:embed="rId5"/>
+          <a:stretch>
+            <a:fillRect/>
+          </a:stretch>
+        </p:blipFill>
+        <p:spPr>
+          <a:xfrm>
+            <a:off x="1153257" y="1478412"/>
+            <a:ext cx="6724650" cy="457200"/>
+          </a:xfrm>
+          <a:prstGeom prst="rect">
+            <a:avLst/>
+          </a:prstGeom>
+        </p:spPr>
+      </p:pic>
+      <p:pic>
+        <p:nvPicPr>
+          <p:cNvPr id="7" name="Picture 6"/>
+          <p:cNvPicPr>
+            <a:picLocks noChangeAspect="1"/>
+          </p:cNvPicPr>
+          <p:nvPr/>
+        </p:nvPicPr>
+        <p:blipFill>
+          <a:blip r:embed="rId6"/>
+          <a:stretch>
+            <a:fillRect/>
+          </a:stretch>
+        </p:blipFill>
+        <p:spPr>
+          <a:xfrm>
+            <a:off x="4933218" y="2128149"/>
+            <a:ext cx="3028950" cy="1095375"/>
+          </a:xfrm>
+          <a:prstGeom prst="rect">
+            <a:avLst/>
+          </a:prstGeom>
+        </p:spPr>
+      </p:pic>
+      <p:pic>
+        <p:nvPicPr>
+          <p:cNvPr id="12" name="Picture 11"/>
+          <p:cNvPicPr>
+            <a:picLocks noChangeAspect="1"/>
+          </p:cNvPicPr>
+          <p:nvPr/>
+        </p:nvPicPr>
+        <p:blipFill>
+          <a:blip r:embed="rId7"/>
+          <a:stretch>
+            <a:fillRect/>
+          </a:stretch>
+        </p:blipFill>
+        <p:spPr>
+          <a:xfrm>
+            <a:off x="1153257" y="4235328"/>
+            <a:ext cx="1514475" cy="285750"/>
+          </a:xfrm>
+          <a:prstGeom prst="rect">
+            <a:avLst/>
+          </a:prstGeom>
+        </p:spPr>
+      </p:pic>
+      <p:pic>
+        <p:nvPicPr>
+          <p:cNvPr id="13" name="Picture 12"/>
+          <p:cNvPicPr>
+            <a:picLocks noChangeAspect="1"/>
+          </p:cNvPicPr>
+          <p:nvPr/>
+        </p:nvPicPr>
+        <p:blipFill>
+          <a:blip r:embed="rId8"/>
+          <a:stretch>
+            <a:fillRect/>
+          </a:stretch>
+        </p:blipFill>
+        <p:spPr>
+          <a:xfrm>
+            <a:off x="2005744" y="4667250"/>
+            <a:ext cx="4562475" cy="266700"/>
+          </a:xfrm>
+          <a:prstGeom prst="rect">
+            <a:avLst/>
+          </a:prstGeom>
+        </p:spPr>
+      </p:pic>
+      <p:pic>
+        <p:nvPicPr>
+          <p:cNvPr id="14" name="Picture 13"/>
+          <p:cNvPicPr>
+            <a:picLocks noChangeAspect="1"/>
+          </p:cNvPicPr>
+          <p:nvPr/>
+        </p:nvPicPr>
+        <p:blipFill>
+          <a:blip r:embed="rId9"/>
+          <a:stretch>
+            <a:fillRect/>
+          </a:stretch>
+        </p:blipFill>
+        <p:spPr>
+          <a:xfrm>
+            <a:off x="7301279" y="4521078"/>
+            <a:ext cx="3028950" cy="1143000"/>
+          </a:xfrm>
+          <a:prstGeom prst="rect">
+            <a:avLst/>
+          </a:prstGeom>
+        </p:spPr>
+      </p:pic>
+      <p:pic>
+        <p:nvPicPr>
+          <p:cNvPr id="15" name="Picture 14"/>
+          <p:cNvPicPr>
+            <a:picLocks noChangeAspect="1"/>
+          </p:cNvPicPr>
+          <p:nvPr/>
+        </p:nvPicPr>
+        <p:blipFill>
+          <a:blip r:embed="rId10"/>
+          <a:stretch>
+            <a:fillRect/>
+          </a:stretch>
+        </p:blipFill>
+        <p:spPr>
+          <a:xfrm>
+            <a:off x="4805729" y="5810250"/>
+            <a:ext cx="2495550" cy="857250"/>
+          </a:xfrm>
+          <a:prstGeom prst="rect">
+            <a:avLst/>
+          </a:prstGeom>
+        </p:spPr>
+      </p:pic>
+    </p:spTree>
+    <p:extLst>
+      <p:ext uri="{BB962C8B-B14F-4D97-AF65-F5344CB8AC3E}">
+        <p14:creationId xmlns:p14="http://schemas.microsoft.com/office/powerpoint/2010/main" val="3050513383"/>
+      </p:ext>
+    </p:extLst>
+  </p:cSld>
+  <p:clrMapOvr>
+    <a:masterClrMapping/>
+  </p:clrMapOvr>
+  <p:timing>
+    <p:tnLst>
+      <p:par>
+        <p:cTn id="1" dur="indefinite" restart="never" nodeType="tmRoot">
+          <p:childTnLst>
+            <p:seq concurrent="1" nextAc="seek">
+              <p:cTn id="2" dur="indefinite" nodeType="mainSeq">
+                <p:childTnLst>
+                  <p:par>
+                    <p:cTn id="3" fill="hold">
+                      <p:stCondLst>
+                        <p:cond delay="indefinite"/>
+                      </p:stCondLst>
+                      <p:childTnLst>
+                        <p:par>
+                          <p:cTn id="4" fill="hold">
+                            <p:stCondLst>
+                              <p:cond delay="0"/>
+                            </p:stCondLst>
+                            <p:childTnLst>
+                              <p:par>
+                                <p:cTn id="5" presetID="1" presetClass="entr" presetSubtype="0" fill="hold" nodeType="clickEffect">
+                                  <p:stCondLst>
+                                    <p:cond delay="0"/>
+                                  </p:stCondLst>
+                                  <p:childTnLst>
+                                    <p:set>
+                                      <p:cBhvr>
+                                        <p:cTn id="6" dur="1" fill="hold">
+                                          <p:stCondLst>
+                                            <p:cond delay="0"/>
+                                          </p:stCondLst>
+                                        </p:cTn>
+                                        <p:tgtEl>
+                                          <p:spTgt spid="3"/>
+                                        </p:tgtEl>
+                                        <p:attrNameLst>
+                                          <p:attrName>style.visibility</p:attrName>
+                                        </p:attrNameLst>
+                                      </p:cBhvr>
+                                      <p:to>
+                                        <p:strVal val="visible"/>
+                                      </p:to>
+                                    </p:set>
+                                  </p:childTnLst>
+                                </p:cTn>
+                              </p:par>
+                              <p:par>
+                                <p:cTn id="7" presetID="1" presetClass="entr" presetSubtype="0" fill="hold" nodeType="withEffect">
+                                  <p:stCondLst>
+                                    <p:cond delay="0"/>
+                                  </p:stCondLst>
+                                  <p:childTnLst>
+                                    <p:set>
+                                      <p:cBhvr>
+                                        <p:cTn id="8" dur="1" fill="hold">
+                                          <p:stCondLst>
+                                            <p:cond delay="0"/>
+                                          </p:stCondLst>
+                                        </p:cTn>
+                                        <p:tgtEl>
+                                          <p:spTgt spid="7"/>
+                                        </p:tgtEl>
+                                        <p:attrNameLst>
+                                          <p:attrName>style.visibility</p:attrName>
+                                        </p:attrNameLst>
+                                      </p:cBhvr>
+                                      <p:to>
+                                        <p:strVal val="visible"/>
+                                      </p:to>
+                                    </p:set>
+                                  </p:childTnLst>
+                                </p:cTn>
+                              </p:par>
+                            </p:childTnLst>
+                          </p:cTn>
+                        </p:par>
+                      </p:childTnLst>
+                    </p:cTn>
+                  </p:par>
+                  <p:par>
+                    <p:cTn id="9" fill="hold">
+                      <p:stCondLst>
+                        <p:cond delay="indefinite"/>
+                      </p:stCondLst>
+                      <p:childTnLst>
+                        <p:par>
+                          <p:cTn id="10" fill="hold">
+                            <p:stCondLst>
+                              <p:cond delay="0"/>
+                            </p:stCondLst>
+                            <p:childTnLst>
+                              <p:par>
+                                <p:cTn id="11" presetID="1" presetClass="entr" presetSubtype="0" fill="hold" nodeType="clickEffect">
+                                  <p:stCondLst>
+                                    <p:cond delay="0"/>
+                                  </p:stCondLst>
+                                  <p:childTnLst>
+                                    <p:set>
+                                      <p:cBhvr>
+                                        <p:cTn id="12" dur="1" fill="hold">
+                                          <p:stCondLst>
+                                            <p:cond delay="0"/>
+                                          </p:stCondLst>
+                                        </p:cTn>
+                                        <p:tgtEl>
+                                          <p:spTgt spid="12"/>
+                                        </p:tgtEl>
+                                        <p:attrNameLst>
+                                          <p:attrName>style.visibility</p:attrName>
+                                        </p:attrNameLst>
+                                      </p:cBhvr>
+                                      <p:to>
+                                        <p:strVal val="visible"/>
+                                      </p:to>
+                                    </p:set>
+                                  </p:childTnLst>
+                                </p:cTn>
+                              </p:par>
+                              <p:par>
+                                <p:cTn id="13" presetID="1" presetClass="entr" presetSubtype="0" fill="hold" nodeType="withEffect">
+                                  <p:stCondLst>
+                                    <p:cond delay="0"/>
+                                  </p:stCondLst>
+                                  <p:childTnLst>
+                                    <p:set>
+                                      <p:cBhvr>
+                                        <p:cTn id="14" dur="1" fill="hold">
+                                          <p:stCondLst>
+                                            <p:cond delay="0"/>
+                                          </p:stCondLst>
+                                        </p:cTn>
+                                        <p:tgtEl>
+                                          <p:spTgt spid="13"/>
+                                        </p:tgtEl>
+                                        <p:attrNameLst>
+                                          <p:attrName>style.visibility</p:attrName>
+                                        </p:attrNameLst>
+                                      </p:cBhvr>
+                                      <p:to>
+                                        <p:strVal val="visible"/>
+                                      </p:to>
+                                    </p:set>
+                                  </p:childTnLst>
+                                </p:cTn>
+                              </p:par>
+                            </p:childTnLst>
+                          </p:cTn>
+                        </p:par>
+                      </p:childTnLst>
+                    </p:cTn>
+                  </p:par>
+                  <p:par>
+                    <p:cTn id="15" fill="hold">
+                      <p:stCondLst>
+                        <p:cond delay="indefinite"/>
+                      </p:stCondLst>
+                      <p:childTnLst>
+                        <p:par>
+                          <p:cTn id="16" fill="hold">
+                            <p:stCondLst>
+                              <p:cond delay="0"/>
+                            </p:stCondLst>
+                            <p:childTnLst>
+                              <p:par>
+                                <p:cTn id="17" presetID="1" presetClass="entr" presetSubtype="0" fill="hold" nodeType="clickEffect">
+                                  <p:stCondLst>
+                                    <p:cond delay="0"/>
+                                  </p:stCondLst>
+                                  <p:childTnLst>
+                                    <p:set>
+                                      <p:cBhvr>
+                                        <p:cTn id="18" dur="1" fill="hold">
+                                          <p:stCondLst>
+                                            <p:cond delay="0"/>
+                                          </p:stCondLst>
+                                        </p:cTn>
+                                        <p:tgtEl>
+                                          <p:spTgt spid="14"/>
+                                        </p:tgtEl>
+                                        <p:attrNameLst>
+                                          <p:attrName>style.visibility</p:attrName>
+                                        </p:attrNameLst>
+                                      </p:cBhvr>
+                                      <p:to>
+                                        <p:strVal val="visible"/>
+                                      </p:to>
+                                    </p:set>
+                                  </p:childTnLst>
+                                </p:cTn>
+                              </p:par>
+                            </p:childTnLst>
+                          </p:cTn>
+                        </p:par>
+                      </p:childTnLst>
+                    </p:cTn>
+                  </p:par>
+                  <p:par>
+                    <p:cTn id="19" fill="hold">
+                      <p:stCondLst>
+                        <p:cond delay="indefinite"/>
+                      </p:stCondLst>
+                      <p:childTnLst>
+                        <p:par>
+                          <p:cTn id="20" fill="hold">
+                            <p:stCondLst>
+                              <p:cond delay="0"/>
+                            </p:stCondLst>
+                            <p:childTnLst>
+                              <p:par>
+                                <p:cTn id="21" presetID="1" presetClass="entr" presetSubtype="0" fill="hold" nodeType="clickEffect">
+                                  <p:stCondLst>
+                                    <p:cond delay="0"/>
+                                  </p:stCondLst>
+                                  <p:childTnLst>
+                                    <p:set>
+                                      <p:cBhvr>
+                                        <p:cTn id="22" dur="1" fill="hold">
+                                          <p:stCondLst>
+                                            <p:cond delay="0"/>
+                                          </p:stCondLst>
+                                        </p:cTn>
+                                        <p:tgtEl>
+                                          <p:spTgt spid="15"/>
+                                        </p:tgtEl>
+                                        <p:attrNameLst>
+                                          <p:attrName>style.visibility</p:attrName>
+                                        </p:attrNameLst>
+                                      </p:cBhvr>
+                                      <p:to>
+                                        <p:strVal val="visible"/>
+                                      </p:to>
+                                    </p:set>
+                                  </p:childTnLst>
+                                </p:cTn>
+                              </p:par>
+                            </p:childTnLst>
+                          </p:cTn>
+                        </p:par>
+                      </p:childTnLst>
+                    </p:cTn>
+                  </p:par>
+                </p:childTnLst>
+              </p:cTn>
+              <p:prevCondLst>
+                <p:cond evt="onPrev" delay="0">
+                  <p:tgtEl>
+                    <p:sldTgt/>
+                  </p:tgtEl>
+                </p:cond>
+              </p:prevCondLst>
+              <p:nextCondLst>
+                <p:cond evt="onNext" delay="0">
+                  <p:tgtEl>
+                    <p:sldTgt/>
+                  </p:tgtEl>
+                </p:cond>
+              </p:nextCondLst>
+            </p:seq>
+          </p:childTnLst>
+        </p:cTn>
+      </p:par>
+    </p:tnLst>
+  </p:timing>
+</p:sld>
+</file>
+
 <file path=ppt/theme/theme1.xml><?xml version="1.0" encoding="utf-8"?>
 <a:theme xmlns:a="http://schemas.openxmlformats.org/drawingml/2006/main" name="Office Theme">
   <a:themeElements>

</xml_diff>

<commit_message>
added dynamic programming slides
</commit_message>
<xml_diff>
--- a/presentations/lukas_chapters.pptx
+++ b/presentations/lukas_chapters.pptx
@@ -19,6 +19,8 @@
     <p:sldId id="268" r:id="rId13"/>
     <p:sldId id="269" r:id="rId14"/>
     <p:sldId id="270" r:id="rId15"/>
+    <p:sldId id="271" r:id="rId16"/>
+    <p:sldId id="272" r:id="rId17"/>
   </p:sldIdLst>
   <p:sldSz cx="12192000" cy="6858000"/>
   <p:notesSz cx="6858000" cy="9144000"/>
@@ -256,7 +258,7 @@
           <a:p>
             <a:fld id="{4ABDDB1E-4DC6-400E-93E9-01B8D6702F69}" type="datetimeFigureOut">
               <a:rPr lang="en-GB" smtClean="0"/>
-              <a:t>26/07/2022</a:t>
+              <a:t>29/07/2022</a:t>
             </a:fld>
             <a:endParaRPr lang="en-GB"/>
           </a:p>
@@ -426,7 +428,7 @@
           <a:p>
             <a:fld id="{4ABDDB1E-4DC6-400E-93E9-01B8D6702F69}" type="datetimeFigureOut">
               <a:rPr lang="en-GB" smtClean="0"/>
-              <a:t>26/07/2022</a:t>
+              <a:t>29/07/2022</a:t>
             </a:fld>
             <a:endParaRPr lang="en-GB"/>
           </a:p>
@@ -606,7 +608,7 @@
           <a:p>
             <a:fld id="{4ABDDB1E-4DC6-400E-93E9-01B8D6702F69}" type="datetimeFigureOut">
               <a:rPr lang="en-GB" smtClean="0"/>
-              <a:t>26/07/2022</a:t>
+              <a:t>29/07/2022</a:t>
             </a:fld>
             <a:endParaRPr lang="en-GB"/>
           </a:p>
@@ -776,7 +778,7 @@
           <a:p>
             <a:fld id="{4ABDDB1E-4DC6-400E-93E9-01B8D6702F69}" type="datetimeFigureOut">
               <a:rPr lang="en-GB" smtClean="0"/>
-              <a:t>26/07/2022</a:t>
+              <a:t>29/07/2022</a:t>
             </a:fld>
             <a:endParaRPr lang="en-GB"/>
           </a:p>
@@ -1022,7 +1024,7 @@
           <a:p>
             <a:fld id="{4ABDDB1E-4DC6-400E-93E9-01B8D6702F69}" type="datetimeFigureOut">
               <a:rPr lang="en-GB" smtClean="0"/>
-              <a:t>26/07/2022</a:t>
+              <a:t>29/07/2022</a:t>
             </a:fld>
             <a:endParaRPr lang="en-GB"/>
           </a:p>
@@ -1254,7 +1256,7 @@
           <a:p>
             <a:fld id="{4ABDDB1E-4DC6-400E-93E9-01B8D6702F69}" type="datetimeFigureOut">
               <a:rPr lang="en-GB" smtClean="0"/>
-              <a:t>26/07/2022</a:t>
+              <a:t>29/07/2022</a:t>
             </a:fld>
             <a:endParaRPr lang="en-GB"/>
           </a:p>
@@ -1621,7 +1623,7 @@
           <a:p>
             <a:fld id="{4ABDDB1E-4DC6-400E-93E9-01B8D6702F69}" type="datetimeFigureOut">
               <a:rPr lang="en-GB" smtClean="0"/>
-              <a:t>26/07/2022</a:t>
+              <a:t>29/07/2022</a:t>
             </a:fld>
             <a:endParaRPr lang="en-GB"/>
           </a:p>
@@ -1739,7 +1741,7 @@
           <a:p>
             <a:fld id="{4ABDDB1E-4DC6-400E-93E9-01B8D6702F69}" type="datetimeFigureOut">
               <a:rPr lang="en-GB" smtClean="0"/>
-              <a:t>26/07/2022</a:t>
+              <a:t>29/07/2022</a:t>
             </a:fld>
             <a:endParaRPr lang="en-GB"/>
           </a:p>
@@ -1834,7 +1836,7 @@
           <a:p>
             <a:fld id="{4ABDDB1E-4DC6-400E-93E9-01B8D6702F69}" type="datetimeFigureOut">
               <a:rPr lang="en-GB" smtClean="0"/>
-              <a:t>26/07/2022</a:t>
+              <a:t>29/07/2022</a:t>
             </a:fld>
             <a:endParaRPr lang="en-GB"/>
           </a:p>
@@ -2111,7 +2113,7 @@
           <a:p>
             <a:fld id="{4ABDDB1E-4DC6-400E-93E9-01B8D6702F69}" type="datetimeFigureOut">
               <a:rPr lang="en-GB" smtClean="0"/>
-              <a:t>26/07/2022</a:t>
+              <a:t>29/07/2022</a:t>
             </a:fld>
             <a:endParaRPr lang="en-GB"/>
           </a:p>
@@ -2364,7 +2366,7 @@
           <a:p>
             <a:fld id="{4ABDDB1E-4DC6-400E-93E9-01B8D6702F69}" type="datetimeFigureOut">
               <a:rPr lang="en-GB" smtClean="0"/>
-              <a:t>26/07/2022</a:t>
+              <a:t>29/07/2022</a:t>
             </a:fld>
             <a:endParaRPr lang="en-GB"/>
           </a:p>
@@ -2577,7 +2579,7 @@
           <a:p>
             <a:fld id="{4ABDDB1E-4DC6-400E-93E9-01B8D6702F69}" type="datetimeFigureOut">
               <a:rPr lang="en-GB" smtClean="0"/>
-              <a:t>26/07/2022</a:t>
+              <a:t>29/07/2022</a:t>
             </a:fld>
             <a:endParaRPr lang="en-GB"/>
           </a:p>
@@ -4876,6 +4878,768 @@
                                         </p:cTn>
                                         <p:tgtEl>
                                           <p:spTgt spid="15"/>
+                                        </p:tgtEl>
+                                        <p:attrNameLst>
+                                          <p:attrName>style.visibility</p:attrName>
+                                        </p:attrNameLst>
+                                      </p:cBhvr>
+                                      <p:to>
+                                        <p:strVal val="visible"/>
+                                      </p:to>
+                                    </p:set>
+                                  </p:childTnLst>
+                                </p:cTn>
+                              </p:par>
+                            </p:childTnLst>
+                          </p:cTn>
+                        </p:par>
+                      </p:childTnLst>
+                    </p:cTn>
+                  </p:par>
+                </p:childTnLst>
+              </p:cTn>
+              <p:prevCondLst>
+                <p:cond evt="onPrev" delay="0">
+                  <p:tgtEl>
+                    <p:sldTgt/>
+                  </p:tgtEl>
+                </p:cond>
+              </p:prevCondLst>
+              <p:nextCondLst>
+                <p:cond evt="onNext" delay="0">
+                  <p:tgtEl>
+                    <p:sldTgt/>
+                  </p:tgtEl>
+                </p:cond>
+              </p:nextCondLst>
+            </p:seq>
+          </p:childTnLst>
+        </p:cTn>
+      </p:par>
+    </p:tnLst>
+  </p:timing>
+</p:sld>
+</file>
+
+<file path=ppt/slides/slide15.xml><?xml version="1.0" encoding="utf-8"?>
+<p:sld xmlns:a="http://schemas.openxmlformats.org/drawingml/2006/main" xmlns:r="http://schemas.openxmlformats.org/officeDocument/2006/relationships" xmlns:p="http://schemas.openxmlformats.org/presentationml/2006/main">
+  <p:cSld>
+    <p:spTree>
+      <p:nvGrpSpPr>
+        <p:cNvPr id="1" name=""/>
+        <p:cNvGrpSpPr/>
+        <p:nvPr/>
+      </p:nvGrpSpPr>
+      <p:grpSpPr>
+        <a:xfrm>
+          <a:off x="0" y="0"/>
+          <a:ext cx="0" cy="0"/>
+          <a:chOff x="0" y="0"/>
+          <a:chExt cx="0" cy="0"/>
+        </a:xfrm>
+      </p:grpSpPr>
+      <p:pic>
+        <p:nvPicPr>
+          <p:cNvPr id="2" name="Picture 1"/>
+          <p:cNvPicPr>
+            <a:picLocks noChangeAspect="1"/>
+          </p:cNvPicPr>
+          <p:nvPr/>
+        </p:nvPicPr>
+        <p:blipFill>
+          <a:blip r:embed="rId2"/>
+          <a:stretch>
+            <a:fillRect/>
+          </a:stretch>
+        </p:blipFill>
+        <p:spPr>
+          <a:xfrm>
+            <a:off x="0" y="0"/>
+            <a:ext cx="3609975" cy="342900"/>
+          </a:xfrm>
+          <a:prstGeom prst="rect">
+            <a:avLst/>
+          </a:prstGeom>
+        </p:spPr>
+      </p:pic>
+      <p:pic>
+        <p:nvPicPr>
+          <p:cNvPr id="10" name="Picture 9"/>
+          <p:cNvPicPr>
+            <a:picLocks noChangeAspect="1"/>
+          </p:cNvPicPr>
+          <p:nvPr/>
+        </p:nvPicPr>
+        <p:blipFill>
+          <a:blip r:embed="rId3"/>
+          <a:stretch>
+            <a:fillRect/>
+          </a:stretch>
+        </p:blipFill>
+        <p:spPr>
+          <a:xfrm>
+            <a:off x="1141095" y="886171"/>
+            <a:ext cx="2228850" cy="247650"/>
+          </a:xfrm>
+          <a:prstGeom prst="rect">
+            <a:avLst/>
+          </a:prstGeom>
+        </p:spPr>
+      </p:pic>
+      <p:pic>
+        <p:nvPicPr>
+          <p:cNvPr id="11" name="Picture 10"/>
+          <p:cNvPicPr>
+            <a:picLocks noChangeAspect="1"/>
+          </p:cNvPicPr>
+          <p:nvPr/>
+        </p:nvPicPr>
+        <p:blipFill>
+          <a:blip r:embed="rId4"/>
+          <a:stretch>
+            <a:fillRect/>
+          </a:stretch>
+        </p:blipFill>
+        <p:spPr>
+          <a:xfrm>
+            <a:off x="4711930" y="1272193"/>
+            <a:ext cx="5362575" cy="342900"/>
+          </a:xfrm>
+          <a:prstGeom prst="rect">
+            <a:avLst/>
+          </a:prstGeom>
+        </p:spPr>
+      </p:pic>
+      <p:pic>
+        <p:nvPicPr>
+          <p:cNvPr id="12" name="Picture 11"/>
+          <p:cNvPicPr>
+            <a:picLocks noChangeAspect="1"/>
+          </p:cNvPicPr>
+          <p:nvPr/>
+        </p:nvPicPr>
+        <p:blipFill>
+          <a:blip r:embed="rId5"/>
+          <a:stretch>
+            <a:fillRect/>
+          </a:stretch>
+        </p:blipFill>
+        <p:spPr>
+          <a:xfrm>
+            <a:off x="2197330" y="2564476"/>
+            <a:ext cx="628650" cy="171450"/>
+          </a:xfrm>
+          <a:prstGeom prst="rect">
+            <a:avLst/>
+          </a:prstGeom>
+        </p:spPr>
+      </p:pic>
+      <p:pic>
+        <p:nvPicPr>
+          <p:cNvPr id="16" name="Picture 15"/>
+          <p:cNvPicPr>
+            <a:picLocks noChangeAspect="1"/>
+          </p:cNvPicPr>
+          <p:nvPr/>
+        </p:nvPicPr>
+        <p:blipFill>
+          <a:blip r:embed="rId6"/>
+          <a:stretch>
+            <a:fillRect/>
+          </a:stretch>
+        </p:blipFill>
+        <p:spPr>
+          <a:xfrm>
+            <a:off x="3404925" y="2469226"/>
+            <a:ext cx="3467100" cy="361950"/>
+          </a:xfrm>
+          <a:prstGeom prst="rect">
+            <a:avLst/>
+          </a:prstGeom>
+        </p:spPr>
+      </p:pic>
+      <p:pic>
+        <p:nvPicPr>
+          <p:cNvPr id="17" name="Picture 16"/>
+          <p:cNvPicPr>
+            <a:picLocks noChangeAspect="1"/>
+          </p:cNvPicPr>
+          <p:nvPr/>
+        </p:nvPicPr>
+        <p:blipFill>
+          <a:blip r:embed="rId7"/>
+          <a:stretch>
+            <a:fillRect/>
+          </a:stretch>
+        </p:blipFill>
+        <p:spPr>
+          <a:xfrm>
+            <a:off x="2197330" y="3736398"/>
+            <a:ext cx="3819525" cy="190500"/>
+          </a:xfrm>
+          <a:prstGeom prst="rect">
+            <a:avLst/>
+          </a:prstGeom>
+        </p:spPr>
+      </p:pic>
+      <p:pic>
+        <p:nvPicPr>
+          <p:cNvPr id="18" name="Picture 17"/>
+          <p:cNvPicPr>
+            <a:picLocks noChangeAspect="1"/>
+          </p:cNvPicPr>
+          <p:nvPr/>
+        </p:nvPicPr>
+        <p:blipFill>
+          <a:blip r:embed="rId8"/>
+          <a:stretch>
+            <a:fillRect/>
+          </a:stretch>
+        </p:blipFill>
+        <p:spPr>
+          <a:xfrm>
+            <a:off x="2197330" y="4893427"/>
+            <a:ext cx="5029200" cy="1200150"/>
+          </a:xfrm>
+          <a:prstGeom prst="rect">
+            <a:avLst/>
+          </a:prstGeom>
+        </p:spPr>
+      </p:pic>
+      <p:pic>
+        <p:nvPicPr>
+          <p:cNvPr id="19" name="Picture 18"/>
+          <p:cNvPicPr>
+            <a:picLocks noChangeAspect="1"/>
+          </p:cNvPicPr>
+          <p:nvPr/>
+        </p:nvPicPr>
+        <p:blipFill>
+          <a:blip r:embed="rId9"/>
+          <a:stretch>
+            <a:fillRect/>
+          </a:stretch>
+        </p:blipFill>
+        <p:spPr>
+          <a:xfrm>
+            <a:off x="4521430" y="4731155"/>
+            <a:ext cx="2705100" cy="190500"/>
+          </a:xfrm>
+          <a:prstGeom prst="rect">
+            <a:avLst/>
+          </a:prstGeom>
+        </p:spPr>
+      </p:pic>
+    </p:spTree>
+    <p:extLst>
+      <p:ext uri="{BB962C8B-B14F-4D97-AF65-F5344CB8AC3E}">
+        <p14:creationId xmlns:p14="http://schemas.microsoft.com/office/powerpoint/2010/main" val="97743561"/>
+      </p:ext>
+    </p:extLst>
+  </p:cSld>
+  <p:clrMapOvr>
+    <a:masterClrMapping/>
+  </p:clrMapOvr>
+  <p:timing>
+    <p:tnLst>
+      <p:par>
+        <p:cTn id="1" dur="indefinite" restart="never" nodeType="tmRoot">
+          <p:childTnLst>
+            <p:seq concurrent="1" nextAc="seek">
+              <p:cTn id="2" dur="indefinite" nodeType="mainSeq">
+                <p:childTnLst>
+                  <p:par>
+                    <p:cTn id="3" fill="hold">
+                      <p:stCondLst>
+                        <p:cond delay="indefinite"/>
+                      </p:stCondLst>
+                      <p:childTnLst>
+                        <p:par>
+                          <p:cTn id="4" fill="hold">
+                            <p:stCondLst>
+                              <p:cond delay="0"/>
+                            </p:stCondLst>
+                            <p:childTnLst>
+                              <p:par>
+                                <p:cTn id="5" presetID="1" presetClass="entr" presetSubtype="0" fill="hold" nodeType="clickEffect">
+                                  <p:stCondLst>
+                                    <p:cond delay="0"/>
+                                  </p:stCondLst>
+                                  <p:childTnLst>
+                                    <p:set>
+                                      <p:cBhvr>
+                                        <p:cTn id="6" dur="1" fill="hold">
+                                          <p:stCondLst>
+                                            <p:cond delay="0"/>
+                                          </p:stCondLst>
+                                        </p:cTn>
+                                        <p:tgtEl>
+                                          <p:spTgt spid="12"/>
+                                        </p:tgtEl>
+                                        <p:attrNameLst>
+                                          <p:attrName>style.visibility</p:attrName>
+                                        </p:attrNameLst>
+                                      </p:cBhvr>
+                                      <p:to>
+                                        <p:strVal val="visible"/>
+                                      </p:to>
+                                    </p:set>
+                                  </p:childTnLst>
+                                </p:cTn>
+                              </p:par>
+                              <p:par>
+                                <p:cTn id="7" presetID="1" presetClass="entr" presetSubtype="0" fill="hold" nodeType="withEffect">
+                                  <p:stCondLst>
+                                    <p:cond delay="0"/>
+                                  </p:stCondLst>
+                                  <p:childTnLst>
+                                    <p:set>
+                                      <p:cBhvr>
+                                        <p:cTn id="8" dur="1" fill="hold">
+                                          <p:stCondLst>
+                                            <p:cond delay="0"/>
+                                          </p:stCondLst>
+                                        </p:cTn>
+                                        <p:tgtEl>
+                                          <p:spTgt spid="16"/>
+                                        </p:tgtEl>
+                                        <p:attrNameLst>
+                                          <p:attrName>style.visibility</p:attrName>
+                                        </p:attrNameLst>
+                                      </p:cBhvr>
+                                      <p:to>
+                                        <p:strVal val="visible"/>
+                                      </p:to>
+                                    </p:set>
+                                  </p:childTnLst>
+                                </p:cTn>
+                              </p:par>
+                            </p:childTnLst>
+                          </p:cTn>
+                        </p:par>
+                      </p:childTnLst>
+                    </p:cTn>
+                  </p:par>
+                  <p:par>
+                    <p:cTn id="9" fill="hold">
+                      <p:stCondLst>
+                        <p:cond delay="indefinite"/>
+                      </p:stCondLst>
+                      <p:childTnLst>
+                        <p:par>
+                          <p:cTn id="10" fill="hold">
+                            <p:stCondLst>
+                              <p:cond delay="0"/>
+                            </p:stCondLst>
+                            <p:childTnLst>
+                              <p:par>
+                                <p:cTn id="11" presetID="1" presetClass="entr" presetSubtype="0" fill="hold" nodeType="clickEffect">
+                                  <p:stCondLst>
+                                    <p:cond delay="0"/>
+                                  </p:stCondLst>
+                                  <p:childTnLst>
+                                    <p:set>
+                                      <p:cBhvr>
+                                        <p:cTn id="12" dur="1" fill="hold">
+                                          <p:stCondLst>
+                                            <p:cond delay="0"/>
+                                          </p:stCondLst>
+                                        </p:cTn>
+                                        <p:tgtEl>
+                                          <p:spTgt spid="17"/>
+                                        </p:tgtEl>
+                                        <p:attrNameLst>
+                                          <p:attrName>style.visibility</p:attrName>
+                                        </p:attrNameLst>
+                                      </p:cBhvr>
+                                      <p:to>
+                                        <p:strVal val="visible"/>
+                                      </p:to>
+                                    </p:set>
+                                  </p:childTnLst>
+                                </p:cTn>
+                              </p:par>
+                            </p:childTnLst>
+                          </p:cTn>
+                        </p:par>
+                      </p:childTnLst>
+                    </p:cTn>
+                  </p:par>
+                  <p:par>
+                    <p:cTn id="13" fill="hold">
+                      <p:stCondLst>
+                        <p:cond delay="indefinite"/>
+                      </p:stCondLst>
+                      <p:childTnLst>
+                        <p:par>
+                          <p:cTn id="14" fill="hold">
+                            <p:stCondLst>
+                              <p:cond delay="0"/>
+                            </p:stCondLst>
+                            <p:childTnLst>
+                              <p:par>
+                                <p:cTn id="15" presetID="1" presetClass="entr" presetSubtype="0" fill="hold" nodeType="clickEffect">
+                                  <p:stCondLst>
+                                    <p:cond delay="0"/>
+                                  </p:stCondLst>
+                                  <p:childTnLst>
+                                    <p:set>
+                                      <p:cBhvr>
+                                        <p:cTn id="16" dur="1" fill="hold">
+                                          <p:stCondLst>
+                                            <p:cond delay="0"/>
+                                          </p:stCondLst>
+                                        </p:cTn>
+                                        <p:tgtEl>
+                                          <p:spTgt spid="18"/>
+                                        </p:tgtEl>
+                                        <p:attrNameLst>
+                                          <p:attrName>style.visibility</p:attrName>
+                                        </p:attrNameLst>
+                                      </p:cBhvr>
+                                      <p:to>
+                                        <p:strVal val="visible"/>
+                                      </p:to>
+                                    </p:set>
+                                  </p:childTnLst>
+                                </p:cTn>
+                              </p:par>
+                              <p:par>
+                                <p:cTn id="17" presetID="1" presetClass="entr" presetSubtype="0" fill="hold" nodeType="withEffect">
+                                  <p:stCondLst>
+                                    <p:cond delay="0"/>
+                                  </p:stCondLst>
+                                  <p:childTnLst>
+                                    <p:set>
+                                      <p:cBhvr>
+                                        <p:cTn id="18" dur="1" fill="hold">
+                                          <p:stCondLst>
+                                            <p:cond delay="0"/>
+                                          </p:stCondLst>
+                                        </p:cTn>
+                                        <p:tgtEl>
+                                          <p:spTgt spid="19"/>
+                                        </p:tgtEl>
+                                        <p:attrNameLst>
+                                          <p:attrName>style.visibility</p:attrName>
+                                        </p:attrNameLst>
+                                      </p:cBhvr>
+                                      <p:to>
+                                        <p:strVal val="visible"/>
+                                      </p:to>
+                                    </p:set>
+                                  </p:childTnLst>
+                                </p:cTn>
+                              </p:par>
+                            </p:childTnLst>
+                          </p:cTn>
+                        </p:par>
+                      </p:childTnLst>
+                    </p:cTn>
+                  </p:par>
+                </p:childTnLst>
+              </p:cTn>
+              <p:prevCondLst>
+                <p:cond evt="onPrev" delay="0">
+                  <p:tgtEl>
+                    <p:sldTgt/>
+                  </p:tgtEl>
+                </p:cond>
+              </p:prevCondLst>
+              <p:nextCondLst>
+                <p:cond evt="onNext" delay="0">
+                  <p:tgtEl>
+                    <p:sldTgt/>
+                  </p:tgtEl>
+                </p:cond>
+              </p:nextCondLst>
+            </p:seq>
+          </p:childTnLst>
+        </p:cTn>
+      </p:par>
+    </p:tnLst>
+  </p:timing>
+</p:sld>
+</file>
+
+<file path=ppt/slides/slide16.xml><?xml version="1.0" encoding="utf-8"?>
+<p:sld xmlns:a="http://schemas.openxmlformats.org/drawingml/2006/main" xmlns:r="http://schemas.openxmlformats.org/officeDocument/2006/relationships" xmlns:p="http://schemas.openxmlformats.org/presentationml/2006/main">
+  <p:cSld>
+    <p:spTree>
+      <p:nvGrpSpPr>
+        <p:cNvPr id="1" name=""/>
+        <p:cNvGrpSpPr/>
+        <p:nvPr/>
+      </p:nvGrpSpPr>
+      <p:grpSpPr>
+        <a:xfrm>
+          <a:off x="0" y="0"/>
+          <a:ext cx="0" cy="0"/>
+          <a:chOff x="0" y="0"/>
+          <a:chExt cx="0" cy="0"/>
+        </a:xfrm>
+      </p:grpSpPr>
+      <p:pic>
+        <p:nvPicPr>
+          <p:cNvPr id="2" name="Picture 1"/>
+          <p:cNvPicPr>
+            <a:picLocks noChangeAspect="1"/>
+          </p:cNvPicPr>
+          <p:nvPr/>
+        </p:nvPicPr>
+        <p:blipFill>
+          <a:blip r:embed="rId2"/>
+          <a:stretch>
+            <a:fillRect/>
+          </a:stretch>
+        </p:blipFill>
+        <p:spPr>
+          <a:xfrm>
+            <a:off x="0" y="0"/>
+            <a:ext cx="3609975" cy="342900"/>
+          </a:xfrm>
+          <a:prstGeom prst="rect">
+            <a:avLst/>
+          </a:prstGeom>
+        </p:spPr>
+      </p:pic>
+      <p:pic>
+        <p:nvPicPr>
+          <p:cNvPr id="3" name="Picture 2"/>
+          <p:cNvPicPr>
+            <a:picLocks noChangeAspect="1"/>
+          </p:cNvPicPr>
+          <p:nvPr/>
+        </p:nvPicPr>
+        <p:blipFill>
+          <a:blip r:embed="rId3"/>
+          <a:stretch>
+            <a:fillRect/>
+          </a:stretch>
+        </p:blipFill>
+        <p:spPr>
+          <a:xfrm>
+            <a:off x="1543482" y="1008437"/>
+            <a:ext cx="1457325" cy="285750"/>
+          </a:xfrm>
+          <a:prstGeom prst="rect">
+            <a:avLst/>
+          </a:prstGeom>
+        </p:spPr>
+      </p:pic>
+      <p:pic>
+        <p:nvPicPr>
+          <p:cNvPr id="4" name="Picture 3"/>
+          <p:cNvPicPr>
+            <a:picLocks noChangeAspect="1"/>
+          </p:cNvPicPr>
+          <p:nvPr/>
+        </p:nvPicPr>
+        <p:blipFill>
+          <a:blip r:embed="rId4"/>
+          <a:stretch>
+            <a:fillRect/>
+          </a:stretch>
+        </p:blipFill>
+        <p:spPr>
+          <a:xfrm>
+            <a:off x="2272144" y="1545388"/>
+            <a:ext cx="2533650" cy="857250"/>
+          </a:xfrm>
+          <a:prstGeom prst="rect">
+            <a:avLst/>
+          </a:prstGeom>
+        </p:spPr>
+      </p:pic>
+      <p:pic>
+        <p:nvPicPr>
+          <p:cNvPr id="5" name="Picture 4"/>
+          <p:cNvPicPr>
+            <a:picLocks noChangeAspect="1"/>
+          </p:cNvPicPr>
+          <p:nvPr/>
+        </p:nvPicPr>
+        <p:blipFill>
+          <a:blip r:embed="rId5"/>
+          <a:stretch>
+            <a:fillRect/>
+          </a:stretch>
+        </p:blipFill>
+        <p:spPr>
+          <a:xfrm>
+            <a:off x="2272144" y="2691505"/>
+            <a:ext cx="4038600" cy="200025"/>
+          </a:xfrm>
+          <a:prstGeom prst="rect">
+            <a:avLst/>
+          </a:prstGeom>
+        </p:spPr>
+      </p:pic>
+      <p:pic>
+        <p:nvPicPr>
+          <p:cNvPr id="6" name="Picture 5"/>
+          <p:cNvPicPr>
+            <a:picLocks noChangeAspect="1"/>
+          </p:cNvPicPr>
+          <p:nvPr/>
+        </p:nvPicPr>
+        <p:blipFill>
+          <a:blip r:embed="rId6"/>
+          <a:stretch>
+            <a:fillRect/>
+          </a:stretch>
+        </p:blipFill>
+        <p:spPr>
+          <a:xfrm>
+            <a:off x="2272144" y="3736917"/>
+            <a:ext cx="3619500" cy="647700"/>
+          </a:xfrm>
+          <a:prstGeom prst="rect">
+            <a:avLst/>
+          </a:prstGeom>
+        </p:spPr>
+      </p:pic>
+      <p:pic>
+        <p:nvPicPr>
+          <p:cNvPr id="7" name="Picture 6"/>
+          <p:cNvPicPr>
+            <a:picLocks noChangeAspect="1"/>
+          </p:cNvPicPr>
+          <p:nvPr/>
+        </p:nvPicPr>
+        <p:blipFill>
+          <a:blip r:embed="rId7"/>
+          <a:stretch>
+            <a:fillRect/>
+          </a:stretch>
+        </p:blipFill>
+        <p:spPr>
+          <a:xfrm>
+            <a:off x="2343581" y="4650711"/>
+            <a:ext cx="3895725" cy="200025"/>
+          </a:xfrm>
+          <a:prstGeom prst="rect">
+            <a:avLst/>
+          </a:prstGeom>
+        </p:spPr>
+      </p:pic>
+    </p:spTree>
+    <p:extLst>
+      <p:ext uri="{BB962C8B-B14F-4D97-AF65-F5344CB8AC3E}">
+        <p14:creationId xmlns:p14="http://schemas.microsoft.com/office/powerpoint/2010/main" val="3426278344"/>
+      </p:ext>
+    </p:extLst>
+  </p:cSld>
+  <p:clrMapOvr>
+    <a:masterClrMapping/>
+  </p:clrMapOvr>
+  <p:timing>
+    <p:tnLst>
+      <p:par>
+        <p:cTn id="1" dur="indefinite" restart="never" nodeType="tmRoot">
+          <p:childTnLst>
+            <p:seq concurrent="1" nextAc="seek">
+              <p:cTn id="2" dur="indefinite" nodeType="mainSeq">
+                <p:childTnLst>
+                  <p:par>
+                    <p:cTn id="3" fill="hold">
+                      <p:stCondLst>
+                        <p:cond delay="indefinite"/>
+                      </p:stCondLst>
+                      <p:childTnLst>
+                        <p:par>
+                          <p:cTn id="4" fill="hold">
+                            <p:stCondLst>
+                              <p:cond delay="0"/>
+                            </p:stCondLst>
+                            <p:childTnLst>
+                              <p:par>
+                                <p:cTn id="5" presetID="1" presetClass="entr" presetSubtype="0" fill="hold" nodeType="clickEffect">
+                                  <p:stCondLst>
+                                    <p:cond delay="0"/>
+                                  </p:stCondLst>
+                                  <p:childTnLst>
+                                    <p:set>
+                                      <p:cBhvr>
+                                        <p:cTn id="6" dur="1" fill="hold">
+                                          <p:stCondLst>
+                                            <p:cond delay="0"/>
+                                          </p:stCondLst>
+                                        </p:cTn>
+                                        <p:tgtEl>
+                                          <p:spTgt spid="5"/>
+                                        </p:tgtEl>
+                                        <p:attrNameLst>
+                                          <p:attrName>style.visibility</p:attrName>
+                                        </p:attrNameLst>
+                                      </p:cBhvr>
+                                      <p:to>
+                                        <p:strVal val="visible"/>
+                                      </p:to>
+                                    </p:set>
+                                  </p:childTnLst>
+                                </p:cTn>
+                              </p:par>
+                            </p:childTnLst>
+                          </p:cTn>
+                        </p:par>
+                      </p:childTnLst>
+                    </p:cTn>
+                  </p:par>
+                  <p:par>
+                    <p:cTn id="7" fill="hold">
+                      <p:stCondLst>
+                        <p:cond delay="indefinite"/>
+                      </p:stCondLst>
+                      <p:childTnLst>
+                        <p:par>
+                          <p:cTn id="8" fill="hold">
+                            <p:stCondLst>
+                              <p:cond delay="0"/>
+                            </p:stCondLst>
+                            <p:childTnLst>
+                              <p:par>
+                                <p:cTn id="9" presetID="1" presetClass="entr" presetSubtype="0" fill="hold" nodeType="clickEffect">
+                                  <p:stCondLst>
+                                    <p:cond delay="0"/>
+                                  </p:stCondLst>
+                                  <p:childTnLst>
+                                    <p:set>
+                                      <p:cBhvr>
+                                        <p:cTn id="10" dur="1" fill="hold">
+                                          <p:stCondLst>
+                                            <p:cond delay="0"/>
+                                          </p:stCondLst>
+                                        </p:cTn>
+                                        <p:tgtEl>
+                                          <p:spTgt spid="6"/>
+                                        </p:tgtEl>
+                                        <p:attrNameLst>
+                                          <p:attrName>style.visibility</p:attrName>
+                                        </p:attrNameLst>
+                                      </p:cBhvr>
+                                      <p:to>
+                                        <p:strVal val="visible"/>
+                                      </p:to>
+                                    </p:set>
+                                  </p:childTnLst>
+                                </p:cTn>
+                              </p:par>
+                              <p:par>
+                                <p:cTn id="11" presetID="1" presetClass="entr" presetSubtype="0" fill="hold" nodeType="withEffect">
+                                  <p:stCondLst>
+                                    <p:cond delay="0"/>
+                                  </p:stCondLst>
+                                  <p:childTnLst>
+                                    <p:set>
+                                      <p:cBhvr>
+                                        <p:cTn id="12" dur="1" fill="hold">
+                                          <p:stCondLst>
+                                            <p:cond delay="0"/>
+                                          </p:stCondLst>
+                                        </p:cTn>
+                                        <p:tgtEl>
+                                          <p:spTgt spid="7"/>
                                         </p:tgtEl>
                                         <p:attrNameLst>
                                           <p:attrName>style.visibility</p:attrName>

</xml_diff>

<commit_message>
added amortized search to presentation
</commit_message>
<xml_diff>
--- a/presentations/lukas_chapters.pptx
+++ b/presentations/lukas_chapters.pptx
@@ -21,6 +21,8 @@
     <p:sldId id="270" r:id="rId15"/>
     <p:sldId id="271" r:id="rId16"/>
     <p:sldId id="272" r:id="rId17"/>
+    <p:sldId id="273" r:id="rId18"/>
+    <p:sldId id="274" r:id="rId19"/>
   </p:sldIdLst>
   <p:sldSz cx="12192000" cy="6858000"/>
   <p:notesSz cx="6858000" cy="9144000"/>
@@ -258,7 +260,7 @@
           <a:p>
             <a:fld id="{4ABDDB1E-4DC6-400E-93E9-01B8D6702F69}" type="datetimeFigureOut">
               <a:rPr lang="en-GB" smtClean="0"/>
-              <a:t>29/07/2022</a:t>
+              <a:t>05/08/2022</a:t>
             </a:fld>
             <a:endParaRPr lang="en-GB"/>
           </a:p>
@@ -428,7 +430,7 @@
           <a:p>
             <a:fld id="{4ABDDB1E-4DC6-400E-93E9-01B8D6702F69}" type="datetimeFigureOut">
               <a:rPr lang="en-GB" smtClean="0"/>
-              <a:t>29/07/2022</a:t>
+              <a:t>05/08/2022</a:t>
             </a:fld>
             <a:endParaRPr lang="en-GB"/>
           </a:p>
@@ -608,7 +610,7 @@
           <a:p>
             <a:fld id="{4ABDDB1E-4DC6-400E-93E9-01B8D6702F69}" type="datetimeFigureOut">
               <a:rPr lang="en-GB" smtClean="0"/>
-              <a:t>29/07/2022</a:t>
+              <a:t>05/08/2022</a:t>
             </a:fld>
             <a:endParaRPr lang="en-GB"/>
           </a:p>
@@ -778,7 +780,7 @@
           <a:p>
             <a:fld id="{4ABDDB1E-4DC6-400E-93E9-01B8D6702F69}" type="datetimeFigureOut">
               <a:rPr lang="en-GB" smtClean="0"/>
-              <a:t>29/07/2022</a:t>
+              <a:t>05/08/2022</a:t>
             </a:fld>
             <a:endParaRPr lang="en-GB"/>
           </a:p>
@@ -1024,7 +1026,7 @@
           <a:p>
             <a:fld id="{4ABDDB1E-4DC6-400E-93E9-01B8D6702F69}" type="datetimeFigureOut">
               <a:rPr lang="en-GB" smtClean="0"/>
-              <a:t>29/07/2022</a:t>
+              <a:t>05/08/2022</a:t>
             </a:fld>
             <a:endParaRPr lang="en-GB"/>
           </a:p>
@@ -1256,7 +1258,7 @@
           <a:p>
             <a:fld id="{4ABDDB1E-4DC6-400E-93E9-01B8D6702F69}" type="datetimeFigureOut">
               <a:rPr lang="en-GB" smtClean="0"/>
-              <a:t>29/07/2022</a:t>
+              <a:t>05/08/2022</a:t>
             </a:fld>
             <a:endParaRPr lang="en-GB"/>
           </a:p>
@@ -1623,7 +1625,7 @@
           <a:p>
             <a:fld id="{4ABDDB1E-4DC6-400E-93E9-01B8D6702F69}" type="datetimeFigureOut">
               <a:rPr lang="en-GB" smtClean="0"/>
-              <a:t>29/07/2022</a:t>
+              <a:t>05/08/2022</a:t>
             </a:fld>
             <a:endParaRPr lang="en-GB"/>
           </a:p>
@@ -1741,7 +1743,7 @@
           <a:p>
             <a:fld id="{4ABDDB1E-4DC6-400E-93E9-01B8D6702F69}" type="datetimeFigureOut">
               <a:rPr lang="en-GB" smtClean="0"/>
-              <a:t>29/07/2022</a:t>
+              <a:t>05/08/2022</a:t>
             </a:fld>
             <a:endParaRPr lang="en-GB"/>
           </a:p>
@@ -1836,7 +1838,7 @@
           <a:p>
             <a:fld id="{4ABDDB1E-4DC6-400E-93E9-01B8D6702F69}" type="datetimeFigureOut">
               <a:rPr lang="en-GB" smtClean="0"/>
-              <a:t>29/07/2022</a:t>
+              <a:t>05/08/2022</a:t>
             </a:fld>
             <a:endParaRPr lang="en-GB"/>
           </a:p>
@@ -2113,7 +2115,7 @@
           <a:p>
             <a:fld id="{4ABDDB1E-4DC6-400E-93E9-01B8D6702F69}" type="datetimeFigureOut">
               <a:rPr lang="en-GB" smtClean="0"/>
-              <a:t>29/07/2022</a:t>
+              <a:t>05/08/2022</a:t>
             </a:fld>
             <a:endParaRPr lang="en-GB"/>
           </a:p>
@@ -2366,7 +2368,7 @@
           <a:p>
             <a:fld id="{4ABDDB1E-4DC6-400E-93E9-01B8D6702F69}" type="datetimeFigureOut">
               <a:rPr lang="en-GB" smtClean="0"/>
-              <a:t>29/07/2022</a:t>
+              <a:t>05/08/2022</a:t>
             </a:fld>
             <a:endParaRPr lang="en-GB"/>
           </a:p>
@@ -2579,7 +2581,7 @@
           <a:p>
             <a:fld id="{4ABDDB1E-4DC6-400E-93E9-01B8D6702F69}" type="datetimeFigureOut">
               <a:rPr lang="en-GB" smtClean="0"/>
-              <a:t>29/07/2022</a:t>
+              <a:t>05/08/2022</a:t>
             </a:fld>
             <a:endParaRPr lang="en-GB"/>
           </a:p>
@@ -5640,6 +5642,1233 @@
                                         </p:cTn>
                                         <p:tgtEl>
                                           <p:spTgt spid="7"/>
+                                        </p:tgtEl>
+                                        <p:attrNameLst>
+                                          <p:attrName>style.visibility</p:attrName>
+                                        </p:attrNameLst>
+                                      </p:cBhvr>
+                                      <p:to>
+                                        <p:strVal val="visible"/>
+                                      </p:to>
+                                    </p:set>
+                                  </p:childTnLst>
+                                </p:cTn>
+                              </p:par>
+                            </p:childTnLst>
+                          </p:cTn>
+                        </p:par>
+                      </p:childTnLst>
+                    </p:cTn>
+                  </p:par>
+                </p:childTnLst>
+              </p:cTn>
+              <p:prevCondLst>
+                <p:cond evt="onPrev" delay="0">
+                  <p:tgtEl>
+                    <p:sldTgt/>
+                  </p:tgtEl>
+                </p:cond>
+              </p:prevCondLst>
+              <p:nextCondLst>
+                <p:cond evt="onNext" delay="0">
+                  <p:tgtEl>
+                    <p:sldTgt/>
+                  </p:tgtEl>
+                </p:cond>
+              </p:nextCondLst>
+            </p:seq>
+          </p:childTnLst>
+        </p:cTn>
+      </p:par>
+    </p:tnLst>
+  </p:timing>
+</p:sld>
+</file>
+
+<file path=ppt/slides/slide17.xml><?xml version="1.0" encoding="utf-8"?>
+<p:sld xmlns:a="http://schemas.openxmlformats.org/drawingml/2006/main" xmlns:r="http://schemas.openxmlformats.org/officeDocument/2006/relationships" xmlns:p="http://schemas.openxmlformats.org/presentationml/2006/main">
+  <p:cSld>
+    <p:spTree>
+      <p:nvGrpSpPr>
+        <p:cNvPr id="1" name=""/>
+        <p:cNvGrpSpPr/>
+        <p:nvPr/>
+      </p:nvGrpSpPr>
+      <p:grpSpPr>
+        <a:xfrm>
+          <a:off x="0" y="0"/>
+          <a:ext cx="0" cy="0"/>
+          <a:chOff x="0" y="0"/>
+          <a:chExt cx="0" cy="0"/>
+        </a:xfrm>
+      </p:grpSpPr>
+      <p:pic>
+        <p:nvPicPr>
+          <p:cNvPr id="8" name="Picture 7"/>
+          <p:cNvPicPr>
+            <a:picLocks noChangeAspect="1"/>
+          </p:cNvPicPr>
+          <p:nvPr/>
+        </p:nvPicPr>
+        <p:blipFill>
+          <a:blip r:embed="rId2"/>
+          <a:stretch>
+            <a:fillRect/>
+          </a:stretch>
+        </p:blipFill>
+        <p:spPr>
+          <a:xfrm>
+            <a:off x="0" y="0"/>
+            <a:ext cx="3019425" cy="371475"/>
+          </a:xfrm>
+          <a:prstGeom prst="rect">
+            <a:avLst/>
+          </a:prstGeom>
+        </p:spPr>
+      </p:pic>
+      <p:pic>
+        <p:nvPicPr>
+          <p:cNvPr id="9" name="Picture 8"/>
+          <p:cNvPicPr>
+            <a:picLocks noChangeAspect="1"/>
+          </p:cNvPicPr>
+          <p:nvPr/>
+        </p:nvPicPr>
+        <p:blipFill>
+          <a:blip r:embed="rId3"/>
+          <a:stretch>
+            <a:fillRect/>
+          </a:stretch>
+        </p:blipFill>
+        <p:spPr>
+          <a:xfrm>
+            <a:off x="6289790" y="371475"/>
+            <a:ext cx="5314950" cy="733425"/>
+          </a:xfrm>
+          <a:prstGeom prst="rect">
+            <a:avLst/>
+          </a:prstGeom>
+        </p:spPr>
+      </p:pic>
+      <p:pic>
+        <p:nvPicPr>
+          <p:cNvPr id="10" name="Picture 9"/>
+          <p:cNvPicPr>
+            <a:picLocks noChangeAspect="1"/>
+          </p:cNvPicPr>
+          <p:nvPr/>
+        </p:nvPicPr>
+        <p:blipFill>
+          <a:blip r:embed="rId4"/>
+          <a:stretch>
+            <a:fillRect/>
+          </a:stretch>
+        </p:blipFill>
+        <p:spPr>
+          <a:xfrm>
+            <a:off x="1543136" y="1394893"/>
+            <a:ext cx="2457450" cy="247650"/>
+          </a:xfrm>
+          <a:prstGeom prst="rect">
+            <a:avLst/>
+          </a:prstGeom>
+        </p:spPr>
+      </p:pic>
+      <p:pic>
+        <p:nvPicPr>
+          <p:cNvPr id="11" name="Picture 10"/>
+          <p:cNvPicPr>
+            <a:picLocks noChangeAspect="1"/>
+          </p:cNvPicPr>
+          <p:nvPr/>
+        </p:nvPicPr>
+        <p:blipFill>
+          <a:blip r:embed="rId5"/>
+          <a:stretch>
+            <a:fillRect/>
+          </a:stretch>
+        </p:blipFill>
+        <p:spPr>
+          <a:xfrm>
+            <a:off x="1543136" y="2231534"/>
+            <a:ext cx="1304925" cy="285750"/>
+          </a:xfrm>
+          <a:prstGeom prst="rect">
+            <a:avLst/>
+          </a:prstGeom>
+        </p:spPr>
+      </p:pic>
+      <p:pic>
+        <p:nvPicPr>
+          <p:cNvPr id="12" name="Picture 11"/>
+          <p:cNvPicPr>
+            <a:picLocks noChangeAspect="1"/>
+          </p:cNvPicPr>
+          <p:nvPr/>
+        </p:nvPicPr>
+        <p:blipFill>
+          <a:blip r:embed="rId6"/>
+          <a:stretch>
+            <a:fillRect/>
+          </a:stretch>
+        </p:blipFill>
+        <p:spPr>
+          <a:xfrm>
+            <a:off x="1576560" y="2690033"/>
+            <a:ext cx="5295900" cy="581025"/>
+          </a:xfrm>
+          <a:prstGeom prst="rect">
+            <a:avLst/>
+          </a:prstGeom>
+        </p:spPr>
+      </p:pic>
+      <p:pic>
+        <p:nvPicPr>
+          <p:cNvPr id="13" name="Picture 12"/>
+          <p:cNvPicPr>
+            <a:picLocks noChangeAspect="1"/>
+          </p:cNvPicPr>
+          <p:nvPr/>
+        </p:nvPicPr>
+        <p:blipFill>
+          <a:blip r:embed="rId7"/>
+          <a:stretch>
+            <a:fillRect/>
+          </a:stretch>
+        </p:blipFill>
+        <p:spPr>
+          <a:xfrm>
+            <a:off x="7579129" y="2231534"/>
+            <a:ext cx="3867150" cy="1314450"/>
+          </a:xfrm>
+          <a:prstGeom prst="rect">
+            <a:avLst/>
+          </a:prstGeom>
+        </p:spPr>
+      </p:pic>
+      <p:pic>
+        <p:nvPicPr>
+          <p:cNvPr id="14" name="Picture 13"/>
+          <p:cNvPicPr>
+            <a:picLocks noChangeAspect="1"/>
+          </p:cNvPicPr>
+          <p:nvPr/>
+        </p:nvPicPr>
+        <p:blipFill>
+          <a:blip r:embed="rId8"/>
+          <a:stretch>
+            <a:fillRect/>
+          </a:stretch>
+        </p:blipFill>
+        <p:spPr>
+          <a:xfrm>
+            <a:off x="1576560" y="3994698"/>
+            <a:ext cx="1323975" cy="323850"/>
+          </a:xfrm>
+          <a:prstGeom prst="rect">
+            <a:avLst/>
+          </a:prstGeom>
+        </p:spPr>
+      </p:pic>
+      <p:pic>
+        <p:nvPicPr>
+          <p:cNvPr id="15" name="Picture 14"/>
+          <p:cNvPicPr>
+            <a:picLocks noChangeAspect="1"/>
+          </p:cNvPicPr>
+          <p:nvPr/>
+        </p:nvPicPr>
+        <p:blipFill>
+          <a:blip r:embed="rId9"/>
+          <a:stretch>
+            <a:fillRect/>
+          </a:stretch>
+        </p:blipFill>
+        <p:spPr>
+          <a:xfrm>
+            <a:off x="1576560" y="4565678"/>
+            <a:ext cx="5305425" cy="581025"/>
+          </a:xfrm>
+          <a:prstGeom prst="rect">
+            <a:avLst/>
+          </a:prstGeom>
+        </p:spPr>
+      </p:pic>
+      <p:pic>
+        <p:nvPicPr>
+          <p:cNvPr id="16" name="Picture 15"/>
+          <p:cNvPicPr>
+            <a:picLocks noChangeAspect="1"/>
+          </p:cNvPicPr>
+          <p:nvPr/>
+        </p:nvPicPr>
+        <p:blipFill>
+          <a:blip r:embed="rId10"/>
+          <a:stretch>
+            <a:fillRect/>
+          </a:stretch>
+        </p:blipFill>
+        <p:spPr>
+          <a:xfrm>
+            <a:off x="4978804" y="5319885"/>
+            <a:ext cx="4533900" cy="657225"/>
+          </a:xfrm>
+          <a:prstGeom prst="rect">
+            <a:avLst/>
+          </a:prstGeom>
+        </p:spPr>
+      </p:pic>
+      <p:pic>
+        <p:nvPicPr>
+          <p:cNvPr id="17" name="Picture 16"/>
+          <p:cNvPicPr>
+            <a:picLocks noChangeAspect="1"/>
+          </p:cNvPicPr>
+          <p:nvPr/>
+        </p:nvPicPr>
+        <p:blipFill>
+          <a:blip r:embed="rId11"/>
+          <a:stretch>
+            <a:fillRect/>
+          </a:stretch>
+        </p:blipFill>
+        <p:spPr>
+          <a:xfrm>
+            <a:off x="9404465" y="5864542"/>
+            <a:ext cx="2200275" cy="571500"/>
+          </a:xfrm>
+          <a:prstGeom prst="rect">
+            <a:avLst/>
+          </a:prstGeom>
+        </p:spPr>
+      </p:pic>
+    </p:spTree>
+    <p:extLst>
+      <p:ext uri="{BB962C8B-B14F-4D97-AF65-F5344CB8AC3E}">
+        <p14:creationId xmlns:p14="http://schemas.microsoft.com/office/powerpoint/2010/main" val="4056921326"/>
+      </p:ext>
+    </p:extLst>
+  </p:cSld>
+  <p:clrMapOvr>
+    <a:masterClrMapping/>
+  </p:clrMapOvr>
+  <p:timing>
+    <p:tnLst>
+      <p:par>
+        <p:cTn id="1" dur="indefinite" restart="never" nodeType="tmRoot">
+          <p:childTnLst>
+            <p:seq concurrent="1" nextAc="seek">
+              <p:cTn id="2" dur="indefinite" nodeType="mainSeq">
+                <p:childTnLst>
+                  <p:par>
+                    <p:cTn id="3" fill="hold">
+                      <p:stCondLst>
+                        <p:cond delay="indefinite"/>
+                      </p:stCondLst>
+                      <p:childTnLst>
+                        <p:par>
+                          <p:cTn id="4" fill="hold">
+                            <p:stCondLst>
+                              <p:cond delay="0"/>
+                            </p:stCondLst>
+                            <p:childTnLst>
+                              <p:par>
+                                <p:cTn id="5" presetID="1" presetClass="entr" presetSubtype="0" fill="hold" nodeType="clickEffect">
+                                  <p:stCondLst>
+                                    <p:cond delay="0"/>
+                                  </p:stCondLst>
+                                  <p:childTnLst>
+                                    <p:set>
+                                      <p:cBhvr>
+                                        <p:cTn id="6" dur="1" fill="hold">
+                                          <p:stCondLst>
+                                            <p:cond delay="0"/>
+                                          </p:stCondLst>
+                                        </p:cTn>
+                                        <p:tgtEl>
+                                          <p:spTgt spid="10"/>
+                                        </p:tgtEl>
+                                        <p:attrNameLst>
+                                          <p:attrName>style.visibility</p:attrName>
+                                        </p:attrNameLst>
+                                      </p:cBhvr>
+                                      <p:to>
+                                        <p:strVal val="visible"/>
+                                      </p:to>
+                                    </p:set>
+                                  </p:childTnLst>
+                                </p:cTn>
+                              </p:par>
+                            </p:childTnLst>
+                          </p:cTn>
+                        </p:par>
+                      </p:childTnLst>
+                    </p:cTn>
+                  </p:par>
+                  <p:par>
+                    <p:cTn id="7" fill="hold">
+                      <p:stCondLst>
+                        <p:cond delay="indefinite"/>
+                      </p:stCondLst>
+                      <p:childTnLst>
+                        <p:par>
+                          <p:cTn id="8" fill="hold">
+                            <p:stCondLst>
+                              <p:cond delay="0"/>
+                            </p:stCondLst>
+                            <p:childTnLst>
+                              <p:par>
+                                <p:cTn id="9" presetID="1" presetClass="entr" presetSubtype="0" fill="hold" nodeType="clickEffect">
+                                  <p:stCondLst>
+                                    <p:cond delay="0"/>
+                                  </p:stCondLst>
+                                  <p:childTnLst>
+                                    <p:set>
+                                      <p:cBhvr>
+                                        <p:cTn id="10" dur="1" fill="hold">
+                                          <p:stCondLst>
+                                            <p:cond delay="0"/>
+                                          </p:stCondLst>
+                                        </p:cTn>
+                                        <p:tgtEl>
+                                          <p:spTgt spid="12"/>
+                                        </p:tgtEl>
+                                        <p:attrNameLst>
+                                          <p:attrName>style.visibility</p:attrName>
+                                        </p:attrNameLst>
+                                      </p:cBhvr>
+                                      <p:to>
+                                        <p:strVal val="visible"/>
+                                      </p:to>
+                                    </p:set>
+                                  </p:childTnLst>
+                                </p:cTn>
+                              </p:par>
+                              <p:par>
+                                <p:cTn id="11" presetID="1" presetClass="entr" presetSubtype="0" fill="hold" nodeType="withEffect">
+                                  <p:stCondLst>
+                                    <p:cond delay="0"/>
+                                  </p:stCondLst>
+                                  <p:childTnLst>
+                                    <p:set>
+                                      <p:cBhvr>
+                                        <p:cTn id="12" dur="1" fill="hold">
+                                          <p:stCondLst>
+                                            <p:cond delay="0"/>
+                                          </p:stCondLst>
+                                        </p:cTn>
+                                        <p:tgtEl>
+                                          <p:spTgt spid="11"/>
+                                        </p:tgtEl>
+                                        <p:attrNameLst>
+                                          <p:attrName>style.visibility</p:attrName>
+                                        </p:attrNameLst>
+                                      </p:cBhvr>
+                                      <p:to>
+                                        <p:strVal val="visible"/>
+                                      </p:to>
+                                    </p:set>
+                                  </p:childTnLst>
+                                </p:cTn>
+                              </p:par>
+                            </p:childTnLst>
+                          </p:cTn>
+                        </p:par>
+                      </p:childTnLst>
+                    </p:cTn>
+                  </p:par>
+                  <p:par>
+                    <p:cTn id="13" fill="hold">
+                      <p:stCondLst>
+                        <p:cond delay="indefinite"/>
+                      </p:stCondLst>
+                      <p:childTnLst>
+                        <p:par>
+                          <p:cTn id="14" fill="hold">
+                            <p:stCondLst>
+                              <p:cond delay="0"/>
+                            </p:stCondLst>
+                            <p:childTnLst>
+                              <p:par>
+                                <p:cTn id="15" presetID="1" presetClass="entr" presetSubtype="0" fill="hold" nodeType="clickEffect">
+                                  <p:stCondLst>
+                                    <p:cond delay="0"/>
+                                  </p:stCondLst>
+                                  <p:childTnLst>
+                                    <p:set>
+                                      <p:cBhvr>
+                                        <p:cTn id="16" dur="1" fill="hold">
+                                          <p:stCondLst>
+                                            <p:cond delay="0"/>
+                                          </p:stCondLst>
+                                        </p:cTn>
+                                        <p:tgtEl>
+                                          <p:spTgt spid="13"/>
+                                        </p:tgtEl>
+                                        <p:attrNameLst>
+                                          <p:attrName>style.visibility</p:attrName>
+                                        </p:attrNameLst>
+                                      </p:cBhvr>
+                                      <p:to>
+                                        <p:strVal val="visible"/>
+                                      </p:to>
+                                    </p:set>
+                                  </p:childTnLst>
+                                </p:cTn>
+                              </p:par>
+                            </p:childTnLst>
+                          </p:cTn>
+                        </p:par>
+                      </p:childTnLst>
+                    </p:cTn>
+                  </p:par>
+                  <p:par>
+                    <p:cTn id="17" fill="hold">
+                      <p:stCondLst>
+                        <p:cond delay="indefinite"/>
+                      </p:stCondLst>
+                      <p:childTnLst>
+                        <p:par>
+                          <p:cTn id="18" fill="hold">
+                            <p:stCondLst>
+                              <p:cond delay="0"/>
+                            </p:stCondLst>
+                            <p:childTnLst>
+                              <p:par>
+                                <p:cTn id="19" presetID="1" presetClass="entr" presetSubtype="0" fill="hold" nodeType="clickEffect">
+                                  <p:stCondLst>
+                                    <p:cond delay="0"/>
+                                  </p:stCondLst>
+                                  <p:childTnLst>
+                                    <p:set>
+                                      <p:cBhvr>
+                                        <p:cTn id="20" dur="1" fill="hold">
+                                          <p:stCondLst>
+                                            <p:cond delay="0"/>
+                                          </p:stCondLst>
+                                        </p:cTn>
+                                        <p:tgtEl>
+                                          <p:spTgt spid="14"/>
+                                        </p:tgtEl>
+                                        <p:attrNameLst>
+                                          <p:attrName>style.visibility</p:attrName>
+                                        </p:attrNameLst>
+                                      </p:cBhvr>
+                                      <p:to>
+                                        <p:strVal val="visible"/>
+                                      </p:to>
+                                    </p:set>
+                                  </p:childTnLst>
+                                </p:cTn>
+                              </p:par>
+                              <p:par>
+                                <p:cTn id="21" presetID="1" presetClass="entr" presetSubtype="0" fill="hold" nodeType="withEffect">
+                                  <p:stCondLst>
+                                    <p:cond delay="0"/>
+                                  </p:stCondLst>
+                                  <p:childTnLst>
+                                    <p:set>
+                                      <p:cBhvr>
+                                        <p:cTn id="22" dur="1" fill="hold">
+                                          <p:stCondLst>
+                                            <p:cond delay="0"/>
+                                          </p:stCondLst>
+                                        </p:cTn>
+                                        <p:tgtEl>
+                                          <p:spTgt spid="15"/>
+                                        </p:tgtEl>
+                                        <p:attrNameLst>
+                                          <p:attrName>style.visibility</p:attrName>
+                                        </p:attrNameLst>
+                                      </p:cBhvr>
+                                      <p:to>
+                                        <p:strVal val="visible"/>
+                                      </p:to>
+                                    </p:set>
+                                  </p:childTnLst>
+                                </p:cTn>
+                              </p:par>
+                            </p:childTnLst>
+                          </p:cTn>
+                        </p:par>
+                      </p:childTnLst>
+                    </p:cTn>
+                  </p:par>
+                  <p:par>
+                    <p:cTn id="23" fill="hold">
+                      <p:stCondLst>
+                        <p:cond delay="indefinite"/>
+                      </p:stCondLst>
+                      <p:childTnLst>
+                        <p:par>
+                          <p:cTn id="24" fill="hold">
+                            <p:stCondLst>
+                              <p:cond delay="0"/>
+                            </p:stCondLst>
+                            <p:childTnLst>
+                              <p:par>
+                                <p:cTn id="25" presetID="1" presetClass="entr" presetSubtype="0" fill="hold" nodeType="clickEffect">
+                                  <p:stCondLst>
+                                    <p:cond delay="0"/>
+                                  </p:stCondLst>
+                                  <p:childTnLst>
+                                    <p:set>
+                                      <p:cBhvr>
+                                        <p:cTn id="26" dur="1" fill="hold">
+                                          <p:stCondLst>
+                                            <p:cond delay="0"/>
+                                          </p:stCondLst>
+                                        </p:cTn>
+                                        <p:tgtEl>
+                                          <p:spTgt spid="16"/>
+                                        </p:tgtEl>
+                                        <p:attrNameLst>
+                                          <p:attrName>style.visibility</p:attrName>
+                                        </p:attrNameLst>
+                                      </p:cBhvr>
+                                      <p:to>
+                                        <p:strVal val="visible"/>
+                                      </p:to>
+                                    </p:set>
+                                  </p:childTnLst>
+                                </p:cTn>
+                              </p:par>
+                              <p:par>
+                                <p:cTn id="27" presetID="1" presetClass="entr" presetSubtype="0" fill="hold" nodeType="withEffect">
+                                  <p:stCondLst>
+                                    <p:cond delay="0"/>
+                                  </p:stCondLst>
+                                  <p:childTnLst>
+                                    <p:set>
+                                      <p:cBhvr>
+                                        <p:cTn id="28" dur="1" fill="hold">
+                                          <p:stCondLst>
+                                            <p:cond delay="0"/>
+                                          </p:stCondLst>
+                                        </p:cTn>
+                                        <p:tgtEl>
+                                          <p:spTgt spid="17"/>
+                                        </p:tgtEl>
+                                        <p:attrNameLst>
+                                          <p:attrName>style.visibility</p:attrName>
+                                        </p:attrNameLst>
+                                      </p:cBhvr>
+                                      <p:to>
+                                        <p:strVal val="visible"/>
+                                      </p:to>
+                                    </p:set>
+                                  </p:childTnLst>
+                                </p:cTn>
+                              </p:par>
+                            </p:childTnLst>
+                          </p:cTn>
+                        </p:par>
+                      </p:childTnLst>
+                    </p:cTn>
+                  </p:par>
+                </p:childTnLst>
+              </p:cTn>
+              <p:prevCondLst>
+                <p:cond evt="onPrev" delay="0">
+                  <p:tgtEl>
+                    <p:sldTgt/>
+                  </p:tgtEl>
+                </p:cond>
+              </p:prevCondLst>
+              <p:nextCondLst>
+                <p:cond evt="onNext" delay="0">
+                  <p:tgtEl>
+                    <p:sldTgt/>
+                  </p:tgtEl>
+                </p:cond>
+              </p:nextCondLst>
+            </p:seq>
+          </p:childTnLst>
+        </p:cTn>
+      </p:par>
+    </p:tnLst>
+  </p:timing>
+</p:sld>
+</file>
+
+<file path=ppt/slides/slide18.xml><?xml version="1.0" encoding="utf-8"?>
+<p:sld xmlns:a="http://schemas.openxmlformats.org/drawingml/2006/main" xmlns:r="http://schemas.openxmlformats.org/officeDocument/2006/relationships" xmlns:p="http://schemas.openxmlformats.org/presentationml/2006/main">
+  <p:cSld>
+    <p:spTree>
+      <p:nvGrpSpPr>
+        <p:cNvPr id="1" name=""/>
+        <p:cNvGrpSpPr/>
+        <p:nvPr/>
+      </p:nvGrpSpPr>
+      <p:grpSpPr>
+        <a:xfrm>
+          <a:off x="0" y="0"/>
+          <a:ext cx="0" cy="0"/>
+          <a:chOff x="0" y="0"/>
+          <a:chExt cx="0" cy="0"/>
+        </a:xfrm>
+      </p:grpSpPr>
+      <p:pic>
+        <p:nvPicPr>
+          <p:cNvPr id="8" name="Picture 7"/>
+          <p:cNvPicPr>
+            <a:picLocks noChangeAspect="1"/>
+          </p:cNvPicPr>
+          <p:nvPr/>
+        </p:nvPicPr>
+        <p:blipFill>
+          <a:blip r:embed="rId2"/>
+          <a:stretch>
+            <a:fillRect/>
+          </a:stretch>
+        </p:blipFill>
+        <p:spPr>
+          <a:xfrm>
+            <a:off x="0" y="0"/>
+            <a:ext cx="3019425" cy="371475"/>
+          </a:xfrm>
+          <a:prstGeom prst="rect">
+            <a:avLst/>
+          </a:prstGeom>
+        </p:spPr>
+      </p:pic>
+      <p:pic>
+        <p:nvPicPr>
+          <p:cNvPr id="9" name="Picture 8"/>
+          <p:cNvPicPr>
+            <a:picLocks noChangeAspect="1"/>
+          </p:cNvPicPr>
+          <p:nvPr/>
+        </p:nvPicPr>
+        <p:blipFill>
+          <a:blip r:embed="rId3"/>
+          <a:stretch>
+            <a:fillRect/>
+          </a:stretch>
+        </p:blipFill>
+        <p:spPr>
+          <a:xfrm>
+            <a:off x="6289790" y="371475"/>
+            <a:ext cx="5314950" cy="733425"/>
+          </a:xfrm>
+          <a:prstGeom prst="rect">
+            <a:avLst/>
+          </a:prstGeom>
+        </p:spPr>
+      </p:pic>
+      <p:pic>
+        <p:nvPicPr>
+          <p:cNvPr id="2" name="Picture 1"/>
+          <p:cNvPicPr>
+            <a:picLocks noChangeAspect="1"/>
+          </p:cNvPicPr>
+          <p:nvPr/>
+        </p:nvPicPr>
+        <p:blipFill>
+          <a:blip r:embed="rId4"/>
+          <a:stretch>
+            <a:fillRect/>
+          </a:stretch>
+        </p:blipFill>
+        <p:spPr>
+          <a:xfrm>
+            <a:off x="966874" y="1104900"/>
+            <a:ext cx="2876550" cy="381000"/>
+          </a:xfrm>
+          <a:prstGeom prst="rect">
+            <a:avLst/>
+          </a:prstGeom>
+        </p:spPr>
+      </p:pic>
+      <p:pic>
+        <p:nvPicPr>
+          <p:cNvPr id="3" name="Picture 2"/>
+          <p:cNvPicPr>
+            <a:picLocks noChangeAspect="1"/>
+          </p:cNvPicPr>
+          <p:nvPr/>
+        </p:nvPicPr>
+        <p:blipFill>
+          <a:blip r:embed="rId5"/>
+          <a:stretch>
+            <a:fillRect/>
+          </a:stretch>
+        </p:blipFill>
+        <p:spPr>
+          <a:xfrm>
+            <a:off x="1845338" y="2000250"/>
+            <a:ext cx="2200275" cy="438150"/>
+          </a:xfrm>
+          <a:prstGeom prst="rect">
+            <a:avLst/>
+          </a:prstGeom>
+        </p:spPr>
+      </p:pic>
+      <p:pic>
+        <p:nvPicPr>
+          <p:cNvPr id="4" name="Picture 3"/>
+          <p:cNvPicPr>
+            <a:picLocks noChangeAspect="1"/>
+          </p:cNvPicPr>
+          <p:nvPr/>
+        </p:nvPicPr>
+        <p:blipFill>
+          <a:blip r:embed="rId6"/>
+          <a:stretch>
+            <a:fillRect/>
+          </a:stretch>
+        </p:blipFill>
+        <p:spPr>
+          <a:xfrm>
+            <a:off x="1845338" y="3882737"/>
+            <a:ext cx="5648325" cy="152400"/>
+          </a:xfrm>
+          <a:prstGeom prst="rect">
+            <a:avLst/>
+          </a:prstGeom>
+        </p:spPr>
+      </p:pic>
+      <p:pic>
+        <p:nvPicPr>
+          <p:cNvPr id="5" name="Picture 4"/>
+          <p:cNvPicPr>
+            <a:picLocks noChangeAspect="1"/>
+          </p:cNvPicPr>
+          <p:nvPr/>
+        </p:nvPicPr>
+        <p:blipFill>
+          <a:blip r:embed="rId7"/>
+          <a:stretch>
+            <a:fillRect/>
+          </a:stretch>
+        </p:blipFill>
+        <p:spPr>
+          <a:xfrm>
+            <a:off x="4666384" y="2800350"/>
+            <a:ext cx="2200275" cy="381000"/>
+          </a:xfrm>
+          <a:prstGeom prst="rect">
+            <a:avLst/>
+          </a:prstGeom>
+        </p:spPr>
+      </p:pic>
+      <p:pic>
+        <p:nvPicPr>
+          <p:cNvPr id="6" name="Picture 5"/>
+          <p:cNvPicPr>
+            <a:picLocks noChangeAspect="1"/>
+          </p:cNvPicPr>
+          <p:nvPr/>
+        </p:nvPicPr>
+        <p:blipFill>
+          <a:blip r:embed="rId8"/>
+          <a:stretch>
+            <a:fillRect/>
+          </a:stretch>
+        </p:blipFill>
+        <p:spPr>
+          <a:xfrm>
+            <a:off x="4666384" y="2438400"/>
+            <a:ext cx="2124075" cy="361950"/>
+          </a:xfrm>
+          <a:prstGeom prst="rect">
+            <a:avLst/>
+          </a:prstGeom>
+        </p:spPr>
+      </p:pic>
+      <p:pic>
+        <p:nvPicPr>
+          <p:cNvPr id="7" name="Picture 6"/>
+          <p:cNvPicPr>
+            <a:picLocks noChangeAspect="1"/>
+          </p:cNvPicPr>
+          <p:nvPr/>
+        </p:nvPicPr>
+        <p:blipFill>
+          <a:blip r:embed="rId9"/>
+          <a:stretch>
+            <a:fillRect/>
+          </a:stretch>
+        </p:blipFill>
+        <p:spPr>
+          <a:xfrm>
+            <a:off x="1845338" y="4222174"/>
+            <a:ext cx="5314950" cy="361950"/>
+          </a:xfrm>
+          <a:prstGeom prst="rect">
+            <a:avLst/>
+          </a:prstGeom>
+        </p:spPr>
+      </p:pic>
+      <p:pic>
+        <p:nvPicPr>
+          <p:cNvPr id="21" name="Picture 20"/>
+          <p:cNvPicPr>
+            <a:picLocks noChangeAspect="1"/>
+          </p:cNvPicPr>
+          <p:nvPr/>
+        </p:nvPicPr>
+        <p:blipFill>
+          <a:blip r:embed="rId10"/>
+          <a:stretch>
+            <a:fillRect/>
+          </a:stretch>
+        </p:blipFill>
+        <p:spPr>
+          <a:xfrm>
+            <a:off x="1845338" y="4695825"/>
+            <a:ext cx="5257800" cy="361950"/>
+          </a:xfrm>
+          <a:prstGeom prst="rect">
+            <a:avLst/>
+          </a:prstGeom>
+        </p:spPr>
+      </p:pic>
+      <p:pic>
+        <p:nvPicPr>
+          <p:cNvPr id="22" name="Picture 21"/>
+          <p:cNvPicPr>
+            <a:picLocks noChangeAspect="1"/>
+          </p:cNvPicPr>
+          <p:nvPr/>
+        </p:nvPicPr>
+        <p:blipFill>
+          <a:blip r:embed="rId11"/>
+          <a:stretch>
+            <a:fillRect/>
+          </a:stretch>
+        </p:blipFill>
+        <p:spPr>
+          <a:xfrm>
+            <a:off x="1873912" y="5173979"/>
+            <a:ext cx="5257800" cy="180975"/>
+          </a:xfrm>
+          <a:prstGeom prst="rect">
+            <a:avLst/>
+          </a:prstGeom>
+        </p:spPr>
+      </p:pic>
+      <p:pic>
+        <p:nvPicPr>
+          <p:cNvPr id="23" name="Picture 22"/>
+          <p:cNvPicPr>
+            <a:picLocks noChangeAspect="1"/>
+          </p:cNvPicPr>
+          <p:nvPr/>
+        </p:nvPicPr>
+        <p:blipFill>
+          <a:blip r:embed="rId12"/>
+          <a:stretch>
+            <a:fillRect/>
+          </a:stretch>
+        </p:blipFill>
+        <p:spPr>
+          <a:xfrm>
+            <a:off x="1873912" y="5492462"/>
+            <a:ext cx="5362575" cy="171450"/>
+          </a:xfrm>
+          <a:prstGeom prst="rect">
+            <a:avLst/>
+          </a:prstGeom>
+        </p:spPr>
+      </p:pic>
+    </p:spTree>
+    <p:extLst>
+      <p:ext uri="{BB962C8B-B14F-4D97-AF65-F5344CB8AC3E}">
+        <p14:creationId xmlns:p14="http://schemas.microsoft.com/office/powerpoint/2010/main" val="3765456974"/>
+      </p:ext>
+    </p:extLst>
+  </p:cSld>
+  <p:clrMapOvr>
+    <a:masterClrMapping/>
+  </p:clrMapOvr>
+  <p:timing>
+    <p:tnLst>
+      <p:par>
+        <p:cTn id="1" dur="indefinite" restart="never" nodeType="tmRoot">
+          <p:childTnLst>
+            <p:seq concurrent="1" nextAc="seek">
+              <p:cTn id="2" dur="indefinite" nodeType="mainSeq">
+                <p:childTnLst>
+                  <p:par>
+                    <p:cTn id="3" fill="hold">
+                      <p:stCondLst>
+                        <p:cond delay="indefinite"/>
+                      </p:stCondLst>
+                      <p:childTnLst>
+                        <p:par>
+                          <p:cTn id="4" fill="hold">
+                            <p:stCondLst>
+                              <p:cond delay="0"/>
+                            </p:stCondLst>
+                            <p:childTnLst>
+                              <p:par>
+                                <p:cTn id="5" presetID="1" presetClass="entr" presetSubtype="0" fill="hold" nodeType="clickEffect">
+                                  <p:stCondLst>
+                                    <p:cond delay="0"/>
+                                  </p:stCondLst>
+                                  <p:childTnLst>
+                                    <p:set>
+                                      <p:cBhvr>
+                                        <p:cTn id="6" dur="1" fill="hold">
+                                          <p:stCondLst>
+                                            <p:cond delay="0"/>
+                                          </p:stCondLst>
+                                        </p:cTn>
+                                        <p:tgtEl>
+                                          <p:spTgt spid="6"/>
+                                        </p:tgtEl>
+                                        <p:attrNameLst>
+                                          <p:attrName>style.visibility</p:attrName>
+                                        </p:attrNameLst>
+                                      </p:cBhvr>
+                                      <p:to>
+                                        <p:strVal val="visible"/>
+                                      </p:to>
+                                    </p:set>
+                                  </p:childTnLst>
+                                </p:cTn>
+                              </p:par>
+                              <p:par>
+                                <p:cTn id="7" presetID="1" presetClass="entr" presetSubtype="0" fill="hold" nodeType="withEffect">
+                                  <p:stCondLst>
+                                    <p:cond delay="0"/>
+                                  </p:stCondLst>
+                                  <p:childTnLst>
+                                    <p:set>
+                                      <p:cBhvr>
+                                        <p:cTn id="8" dur="1" fill="hold">
+                                          <p:stCondLst>
+                                            <p:cond delay="0"/>
+                                          </p:stCondLst>
+                                        </p:cTn>
+                                        <p:tgtEl>
+                                          <p:spTgt spid="5"/>
+                                        </p:tgtEl>
+                                        <p:attrNameLst>
+                                          <p:attrName>style.visibility</p:attrName>
+                                        </p:attrNameLst>
+                                      </p:cBhvr>
+                                      <p:to>
+                                        <p:strVal val="visible"/>
+                                      </p:to>
+                                    </p:set>
+                                  </p:childTnLst>
+                                </p:cTn>
+                              </p:par>
+                            </p:childTnLst>
+                          </p:cTn>
+                        </p:par>
+                      </p:childTnLst>
+                    </p:cTn>
+                  </p:par>
+                  <p:par>
+                    <p:cTn id="9" fill="hold">
+                      <p:stCondLst>
+                        <p:cond delay="indefinite"/>
+                      </p:stCondLst>
+                      <p:childTnLst>
+                        <p:par>
+                          <p:cTn id="10" fill="hold">
+                            <p:stCondLst>
+                              <p:cond delay="0"/>
+                            </p:stCondLst>
+                            <p:childTnLst>
+                              <p:par>
+                                <p:cTn id="11" presetID="1" presetClass="entr" presetSubtype="0" fill="hold" nodeType="clickEffect">
+                                  <p:stCondLst>
+                                    <p:cond delay="0"/>
+                                  </p:stCondLst>
+                                  <p:childTnLst>
+                                    <p:set>
+                                      <p:cBhvr>
+                                        <p:cTn id="12" dur="1" fill="hold">
+                                          <p:stCondLst>
+                                            <p:cond delay="0"/>
+                                          </p:stCondLst>
+                                        </p:cTn>
+                                        <p:tgtEl>
+                                          <p:spTgt spid="4"/>
+                                        </p:tgtEl>
+                                        <p:attrNameLst>
+                                          <p:attrName>style.visibility</p:attrName>
+                                        </p:attrNameLst>
+                                      </p:cBhvr>
+                                      <p:to>
+                                        <p:strVal val="visible"/>
+                                      </p:to>
+                                    </p:set>
+                                  </p:childTnLst>
+                                </p:cTn>
+                              </p:par>
+                            </p:childTnLst>
+                          </p:cTn>
+                        </p:par>
+                      </p:childTnLst>
+                    </p:cTn>
+                  </p:par>
+                  <p:par>
+                    <p:cTn id="13" fill="hold">
+                      <p:stCondLst>
+                        <p:cond delay="indefinite"/>
+                      </p:stCondLst>
+                      <p:childTnLst>
+                        <p:par>
+                          <p:cTn id="14" fill="hold">
+                            <p:stCondLst>
+                              <p:cond delay="0"/>
+                            </p:stCondLst>
+                            <p:childTnLst>
+                              <p:par>
+                                <p:cTn id="15" presetID="1" presetClass="entr" presetSubtype="0" fill="hold" nodeType="clickEffect">
+                                  <p:stCondLst>
+                                    <p:cond delay="0"/>
+                                  </p:stCondLst>
+                                  <p:childTnLst>
+                                    <p:set>
+                                      <p:cBhvr>
+                                        <p:cTn id="16" dur="1" fill="hold">
+                                          <p:stCondLst>
+                                            <p:cond delay="0"/>
+                                          </p:stCondLst>
+                                        </p:cTn>
+                                        <p:tgtEl>
+                                          <p:spTgt spid="7"/>
+                                        </p:tgtEl>
+                                        <p:attrNameLst>
+                                          <p:attrName>style.visibility</p:attrName>
+                                        </p:attrNameLst>
+                                      </p:cBhvr>
+                                      <p:to>
+                                        <p:strVal val="visible"/>
+                                      </p:to>
+                                    </p:set>
+                                  </p:childTnLst>
+                                </p:cTn>
+                              </p:par>
+                            </p:childTnLst>
+                          </p:cTn>
+                        </p:par>
+                      </p:childTnLst>
+                    </p:cTn>
+                  </p:par>
+                  <p:par>
+                    <p:cTn id="17" fill="hold">
+                      <p:stCondLst>
+                        <p:cond delay="indefinite"/>
+                      </p:stCondLst>
+                      <p:childTnLst>
+                        <p:par>
+                          <p:cTn id="18" fill="hold">
+                            <p:stCondLst>
+                              <p:cond delay="0"/>
+                            </p:stCondLst>
+                            <p:childTnLst>
+                              <p:par>
+                                <p:cTn id="19" presetID="1" presetClass="entr" presetSubtype="0" fill="hold" nodeType="clickEffect">
+                                  <p:stCondLst>
+                                    <p:cond delay="0"/>
+                                  </p:stCondLst>
+                                  <p:childTnLst>
+                                    <p:set>
+                                      <p:cBhvr>
+                                        <p:cTn id="20" dur="1" fill="hold">
+                                          <p:stCondLst>
+                                            <p:cond delay="0"/>
+                                          </p:stCondLst>
+                                        </p:cTn>
+                                        <p:tgtEl>
+                                          <p:spTgt spid="21"/>
+                                        </p:tgtEl>
+                                        <p:attrNameLst>
+                                          <p:attrName>style.visibility</p:attrName>
+                                        </p:attrNameLst>
+                                      </p:cBhvr>
+                                      <p:to>
+                                        <p:strVal val="visible"/>
+                                      </p:to>
+                                    </p:set>
+                                  </p:childTnLst>
+                                </p:cTn>
+                              </p:par>
+                            </p:childTnLst>
+                          </p:cTn>
+                        </p:par>
+                      </p:childTnLst>
+                    </p:cTn>
+                  </p:par>
+                  <p:par>
+                    <p:cTn id="21" fill="hold">
+                      <p:stCondLst>
+                        <p:cond delay="indefinite"/>
+                      </p:stCondLst>
+                      <p:childTnLst>
+                        <p:par>
+                          <p:cTn id="22" fill="hold">
+                            <p:stCondLst>
+                              <p:cond delay="0"/>
+                            </p:stCondLst>
+                            <p:childTnLst>
+                              <p:par>
+                                <p:cTn id="23" presetID="1" presetClass="entr" presetSubtype="0" fill="hold" nodeType="clickEffect">
+                                  <p:stCondLst>
+                                    <p:cond delay="0"/>
+                                  </p:stCondLst>
+                                  <p:childTnLst>
+                                    <p:set>
+                                      <p:cBhvr>
+                                        <p:cTn id="24" dur="1" fill="hold">
+                                          <p:stCondLst>
+                                            <p:cond delay="0"/>
+                                          </p:stCondLst>
+                                        </p:cTn>
+                                        <p:tgtEl>
+                                          <p:spTgt spid="22"/>
+                                        </p:tgtEl>
+                                        <p:attrNameLst>
+                                          <p:attrName>style.visibility</p:attrName>
+                                        </p:attrNameLst>
+                                      </p:cBhvr>
+                                      <p:to>
+                                        <p:strVal val="visible"/>
+                                      </p:to>
+                                    </p:set>
+                                  </p:childTnLst>
+                                </p:cTn>
+                              </p:par>
+                            </p:childTnLst>
+                          </p:cTn>
+                        </p:par>
+                      </p:childTnLst>
+                    </p:cTn>
+                  </p:par>
+                  <p:par>
+                    <p:cTn id="25" fill="hold">
+                      <p:stCondLst>
+                        <p:cond delay="indefinite"/>
+                      </p:stCondLst>
+                      <p:childTnLst>
+                        <p:par>
+                          <p:cTn id="26" fill="hold">
+                            <p:stCondLst>
+                              <p:cond delay="0"/>
+                            </p:stCondLst>
+                            <p:childTnLst>
+                              <p:par>
+                                <p:cTn id="27" presetID="1" presetClass="entr" presetSubtype="0" fill="hold" nodeType="clickEffect">
+                                  <p:stCondLst>
+                                    <p:cond delay="0"/>
+                                  </p:stCondLst>
+                                  <p:childTnLst>
+                                    <p:set>
+                                      <p:cBhvr>
+                                        <p:cTn id="28" dur="1" fill="hold">
+                                          <p:stCondLst>
+                                            <p:cond delay="0"/>
+                                          </p:stCondLst>
+                                        </p:cTn>
+                                        <p:tgtEl>
+                                          <p:spTgt spid="23"/>
                                         </p:tgtEl>
                                         <p:attrNameLst>
                                           <p:attrName>style.visibility</p:attrName>

</xml_diff>